<commit_message>
added new steve intro slides
</commit_message>
<xml_diff>
--- a/Tut1.Lecture.0.short.intro.pptx
+++ b/Tut1.Lecture.0.short.intro.pptx
@@ -5,7 +5,7 @@
     <p:sldMasterId id="2147483648" r:id="rId1"/>
   </p:sldMasterIdLst>
   <p:notesMasterIdLst>
-    <p:notesMasterId r:id="rId8"/>
+    <p:notesMasterId r:id="rId15"/>
   </p:notesMasterIdLst>
   <p:sldIdLst>
     <p:sldId id="258" r:id="rId2"/>
@@ -14,6 +14,13 @@
     <p:sldId id="263" r:id="rId5"/>
     <p:sldId id="264" r:id="rId6"/>
     <p:sldId id="260" r:id="rId7"/>
+    <p:sldId id="265" r:id="rId8"/>
+    <p:sldId id="266" r:id="rId9"/>
+    <p:sldId id="270" r:id="rId10"/>
+    <p:sldId id="271" r:id="rId11"/>
+    <p:sldId id="267" r:id="rId12"/>
+    <p:sldId id="268" r:id="rId13"/>
+    <p:sldId id="269" r:id="rId14"/>
   </p:sldIdLst>
   <p:sldSz cx="12192000" cy="6858000"/>
   <p:notesSz cx="6858000" cy="9144000"/>
@@ -202,7 +209,7 @@
           <a:p>
             <a:fld id="{DC985642-C640-47AA-A41A-EB42A2C97A5D}" type="datetimeFigureOut">
               <a:rPr lang="en-US" smtClean="0"/>
-              <a:t>6/26/2020</a:t>
+              <a:t>7/11/2020</a:t>
             </a:fld>
             <a:endParaRPr lang="en-US"/>
           </a:p>
@@ -697,7 +704,7 @@
           <a:p>
             <a:fld id="{C793F272-2E12-484B-9775-C35CC4B5D145}" type="datetimeFigureOut">
               <a:rPr lang="en-US" smtClean="0"/>
-              <a:t>6/26/2020</a:t>
+              <a:t>7/11/2020</a:t>
             </a:fld>
             <a:endParaRPr lang="en-US"/>
           </a:p>
@@ -867,7 +874,7 @@
           <a:p>
             <a:fld id="{C793F272-2E12-484B-9775-C35CC4B5D145}" type="datetimeFigureOut">
               <a:rPr lang="en-US" smtClean="0"/>
-              <a:t>6/26/2020</a:t>
+              <a:t>7/11/2020</a:t>
             </a:fld>
             <a:endParaRPr lang="en-US"/>
           </a:p>
@@ -1047,7 +1054,7 @@
           <a:p>
             <a:fld id="{C793F272-2E12-484B-9775-C35CC4B5D145}" type="datetimeFigureOut">
               <a:rPr lang="en-US" smtClean="0"/>
-              <a:t>6/26/2020</a:t>
+              <a:t>7/11/2020</a:t>
             </a:fld>
             <a:endParaRPr lang="en-US"/>
           </a:p>
@@ -1217,7 +1224,7 @@
           <a:p>
             <a:fld id="{C793F272-2E12-484B-9775-C35CC4B5D145}" type="datetimeFigureOut">
               <a:rPr lang="en-US" smtClean="0"/>
-              <a:t>6/26/2020</a:t>
+              <a:t>7/11/2020</a:t>
             </a:fld>
             <a:endParaRPr lang="en-US"/>
           </a:p>
@@ -1463,7 +1470,7 @@
           <a:p>
             <a:fld id="{C793F272-2E12-484B-9775-C35CC4B5D145}" type="datetimeFigureOut">
               <a:rPr lang="en-US" smtClean="0"/>
-              <a:t>6/26/2020</a:t>
+              <a:t>7/11/2020</a:t>
             </a:fld>
             <a:endParaRPr lang="en-US"/>
           </a:p>
@@ -1695,7 +1702,7 @@
           <a:p>
             <a:fld id="{C793F272-2E12-484B-9775-C35CC4B5D145}" type="datetimeFigureOut">
               <a:rPr lang="en-US" smtClean="0"/>
-              <a:t>6/26/2020</a:t>
+              <a:t>7/11/2020</a:t>
             </a:fld>
             <a:endParaRPr lang="en-US"/>
           </a:p>
@@ -2062,7 +2069,7 @@
           <a:p>
             <a:fld id="{C793F272-2E12-484B-9775-C35CC4B5D145}" type="datetimeFigureOut">
               <a:rPr lang="en-US" smtClean="0"/>
-              <a:t>6/26/2020</a:t>
+              <a:t>7/11/2020</a:t>
             </a:fld>
             <a:endParaRPr lang="en-US"/>
           </a:p>
@@ -2180,7 +2187,7 @@
           <a:p>
             <a:fld id="{C793F272-2E12-484B-9775-C35CC4B5D145}" type="datetimeFigureOut">
               <a:rPr lang="en-US" smtClean="0"/>
-              <a:t>6/26/2020</a:t>
+              <a:t>7/11/2020</a:t>
             </a:fld>
             <a:endParaRPr lang="en-US"/>
           </a:p>
@@ -2275,7 +2282,7 @@
           <a:p>
             <a:fld id="{C793F272-2E12-484B-9775-C35CC4B5D145}" type="datetimeFigureOut">
               <a:rPr lang="en-US" smtClean="0"/>
-              <a:t>6/26/2020</a:t>
+              <a:t>7/11/2020</a:t>
             </a:fld>
             <a:endParaRPr lang="en-US"/>
           </a:p>
@@ -2552,7 +2559,7 @@
           <a:p>
             <a:fld id="{C793F272-2E12-484B-9775-C35CC4B5D145}" type="datetimeFigureOut">
               <a:rPr lang="en-US" smtClean="0"/>
-              <a:t>6/26/2020</a:t>
+              <a:t>7/11/2020</a:t>
             </a:fld>
             <a:endParaRPr lang="en-US"/>
           </a:p>
@@ -2805,7 +2812,7 @@
           <a:p>
             <a:fld id="{C793F272-2E12-484B-9775-C35CC4B5D145}" type="datetimeFigureOut">
               <a:rPr lang="en-US" smtClean="0"/>
-              <a:t>6/26/2020</a:t>
+              <a:t>7/11/2020</a:t>
             </a:fld>
             <a:endParaRPr lang="en-US"/>
           </a:p>
@@ -3018,7 +3025,7 @@
           <a:p>
             <a:fld id="{C793F272-2E12-484B-9775-C35CC4B5D145}" type="datetimeFigureOut">
               <a:rPr lang="en-US" smtClean="0"/>
-              <a:t>6/26/2020</a:t>
+              <a:t>7/11/2020</a:t>
             </a:fld>
             <a:endParaRPr lang="en-US"/>
           </a:p>
@@ -4609,6 +4616,2501 @@
         <p:cTn id="1" dur="indefinite" restart="never" nodeType="tmRoot"/>
       </p:par>
     </p:tnLst>
+  </p:timing>
+</p:sld>
+</file>
+
+<file path=ppt/slides/slide10.xml><?xml version="1.0" encoding="utf-8"?>
+<p:sld xmlns:a="http://schemas.openxmlformats.org/drawingml/2006/main" xmlns:r="http://schemas.openxmlformats.org/officeDocument/2006/relationships" xmlns:p="http://schemas.openxmlformats.org/presentationml/2006/main">
+  <p:cSld>
+    <p:spTree>
+      <p:nvGrpSpPr>
+        <p:cNvPr id="1" name=""/>
+        <p:cNvGrpSpPr/>
+        <p:nvPr/>
+      </p:nvGrpSpPr>
+      <p:grpSpPr>
+        <a:xfrm>
+          <a:off x="0" y="0"/>
+          <a:ext cx="0" cy="0"/>
+          <a:chOff x="0" y="0"/>
+          <a:chExt cx="0" cy="0"/>
+        </a:xfrm>
+      </p:grpSpPr>
+      <p:sp>
+        <p:nvSpPr>
+          <p:cNvPr id="5" name="Title 4"/>
+          <p:cNvSpPr>
+            <a:spLocks noGrp="1"/>
+          </p:cNvSpPr>
+          <p:nvPr>
+            <p:ph type="title"/>
+          </p:nvPr>
+        </p:nvSpPr>
+        <p:spPr>
+          <a:xfrm>
+            <a:off x="381000" y="0"/>
+            <a:ext cx="8229600" cy="1371600"/>
+          </a:xfrm>
+        </p:spPr>
+        <p:txBody>
+          <a:bodyPr rtlCol="0">
+            <a:normAutofit/>
+          </a:bodyPr>
+          <a:lstStyle/>
+          <a:p>
+            <a:pPr algn="l" eaLnBrk="1" fontAlgn="auto" hangingPunct="1">
+              <a:spcAft>
+                <a:spcPts val="0"/>
+              </a:spcAft>
+              <a:defRPr/>
+            </a:pPr>
+            <a:r>
+              <a:rPr lang="en-US" dirty="0" smtClean="0"/>
+              <a:t>Duke-NUS Medical School</a:t>
+            </a:r>
+            <a:endParaRPr lang="en-US" dirty="0"/>
+          </a:p>
+        </p:txBody>
+      </p:sp>
+      <p:sp>
+        <p:nvSpPr>
+          <p:cNvPr id="4" name="Slide Number Placeholder 3"/>
+          <p:cNvSpPr>
+            <a:spLocks noGrp="1"/>
+          </p:cNvSpPr>
+          <p:nvPr>
+            <p:ph type="sldNum" sz="quarter" idx="12"/>
+          </p:nvPr>
+        </p:nvSpPr>
+        <p:spPr/>
+        <p:txBody>
+          <a:bodyPr/>
+          <a:lstStyle/>
+          <a:p>
+            <a:pPr>
+              <a:defRPr/>
+            </a:pPr>
+            <a:fld id="{9DA1265D-4113-4B55-A21B-63C3D1CC44F0}" type="slidenum">
+              <a:rPr lang="en-US"/>
+              <a:pPr>
+                <a:defRPr/>
+              </a:pPr>
+              <a:t>10</a:t>
+            </a:fld>
+            <a:endParaRPr lang="en-US"/>
+          </a:p>
+        </p:txBody>
+      </p:sp>
+      <p:pic>
+        <p:nvPicPr>
+          <p:cNvPr id="5124" name="Picture 6" descr="http://s3.frank.itlab.us/photo-essays/small/jan_06_0974_duke-nus.jpg"/>
+          <p:cNvPicPr>
+            <a:picLocks noChangeAspect="1" noChangeArrowheads="1"/>
+          </p:cNvPicPr>
+          <p:nvPr/>
+        </p:nvPicPr>
+        <p:blipFill>
+          <a:blip r:embed="rId2" cstate="print">
+            <a:extLst>
+              <a:ext uri="{28A0092B-C50C-407E-A947-70E740481C1C}">
+                <a14:useLocalDpi xmlns:a14="http://schemas.microsoft.com/office/drawing/2010/main" val="0"/>
+              </a:ext>
+            </a:extLst>
+          </a:blip>
+          <a:srcRect/>
+          <a:stretch>
+            <a:fillRect/>
+          </a:stretch>
+        </p:blipFill>
+        <p:spPr bwMode="auto">
+          <a:xfrm>
+            <a:off x="533400" y="1066800"/>
+            <a:ext cx="3706813" cy="4938713"/>
+          </a:xfrm>
+          <a:prstGeom prst="rect">
+            <a:avLst/>
+          </a:prstGeom>
+          <a:noFill/>
+          <a:ln>
+            <a:noFill/>
+          </a:ln>
+          <a:extLst>
+            <a:ext uri="{909E8E84-426E-40DD-AFC4-6F175D3DCCD1}">
+              <a14:hiddenFill xmlns:a14="http://schemas.microsoft.com/office/drawing/2010/main">
+                <a:solidFill>
+                  <a:srgbClr val="FFFFFF"/>
+                </a:solidFill>
+              </a14:hiddenFill>
+            </a:ext>
+            <a:ext uri="{91240B29-F687-4F45-9708-019B960494DF}">
+              <a14:hiddenLine xmlns:a14="http://schemas.microsoft.com/office/drawing/2010/main" w="9525">
+                <a:solidFill>
+                  <a:srgbClr val="000000"/>
+                </a:solidFill>
+                <a:miter lim="800000"/>
+                <a:headEnd/>
+                <a:tailEnd/>
+              </a14:hiddenLine>
+            </a:ext>
+          </a:extLst>
+        </p:spPr>
+      </p:pic>
+      <p:pic>
+        <p:nvPicPr>
+          <p:cNvPr id="8" name="Picture 7"/>
+          <p:cNvPicPr>
+            <a:picLocks noChangeAspect="1"/>
+          </p:cNvPicPr>
+          <p:nvPr/>
+        </p:nvPicPr>
+        <p:blipFill rotWithShape="1">
+          <a:blip r:embed="rId3"/>
+          <a:srcRect t="4284" r="61413" b="12602"/>
+          <a:stretch/>
+        </p:blipFill>
+        <p:spPr>
+          <a:xfrm>
+            <a:off x="7620000" y="0"/>
+            <a:ext cx="2805223" cy="1263502"/>
+          </a:xfrm>
+          <a:prstGeom prst="rect">
+            <a:avLst/>
+          </a:prstGeom>
+        </p:spPr>
+      </p:pic>
+      <p:sp>
+        <p:nvSpPr>
+          <p:cNvPr id="7" name="TextBox 6"/>
+          <p:cNvSpPr txBox="1">
+            <a:spLocks noChangeArrowheads="1"/>
+          </p:cNvSpPr>
+          <p:nvPr/>
+        </p:nvSpPr>
+        <p:spPr bwMode="auto">
+          <a:xfrm>
+            <a:off x="4648200" y="1447800"/>
+            <a:ext cx="6705600" cy="5262979"/>
+          </a:xfrm>
+          <a:prstGeom prst="rect">
+            <a:avLst/>
+          </a:prstGeom>
+          <a:noFill/>
+          <a:ln>
+            <a:noFill/>
+          </a:ln>
+          <a:extLst>
+            <a:ext uri="{909E8E84-426E-40DD-AFC4-6F175D3DCCD1}">
+              <a14:hiddenFill xmlns:a14="http://schemas.microsoft.com/office/drawing/2010/main">
+                <a:solidFill>
+                  <a:srgbClr val="FFFFFF"/>
+                </a:solidFill>
+              </a14:hiddenFill>
+            </a:ext>
+            <a:ext uri="{91240B29-F687-4F45-9708-019B960494DF}">
+              <a14:hiddenLine xmlns:a14="http://schemas.microsoft.com/office/drawing/2010/main" w="9525">
+                <a:solidFill>
+                  <a:srgbClr val="000000"/>
+                </a:solidFill>
+                <a:miter lim="800000"/>
+                <a:headEnd/>
+                <a:tailEnd/>
+              </a14:hiddenLine>
+            </a:ext>
+          </a:extLst>
+        </p:spPr>
+        <p:txBody>
+          <a:bodyPr wrap="square">
+            <a:spAutoFit/>
+          </a:bodyPr>
+          <a:lstStyle>
+            <a:lvl1pPr>
+              <a:spcBef>
+                <a:spcPct val="20000"/>
+              </a:spcBef>
+              <a:buFont typeface="Arial" panose="020B0604020202020204" pitchFamily="34" charset="0"/>
+              <a:buChar char="•"/>
+              <a:defRPr sz="3200">
+                <a:solidFill>
+                  <a:schemeClr val="tx1"/>
+                </a:solidFill>
+                <a:latin typeface="Calibri" panose="020F0502020204030204" pitchFamily="34" charset="0"/>
+              </a:defRPr>
+            </a:lvl1pPr>
+            <a:lvl2pPr marL="742950" indent="-285750">
+              <a:spcBef>
+                <a:spcPct val="20000"/>
+              </a:spcBef>
+              <a:buFont typeface="Arial" panose="020B0604020202020204" pitchFamily="34" charset="0"/>
+              <a:buChar char="–"/>
+              <a:defRPr sz="2800">
+                <a:solidFill>
+                  <a:schemeClr val="tx1"/>
+                </a:solidFill>
+                <a:latin typeface="Calibri" panose="020F0502020204030204" pitchFamily="34" charset="0"/>
+              </a:defRPr>
+            </a:lvl2pPr>
+            <a:lvl3pPr marL="1143000" indent="-228600">
+              <a:spcBef>
+                <a:spcPct val="20000"/>
+              </a:spcBef>
+              <a:buFont typeface="Arial" panose="020B0604020202020204" pitchFamily="34" charset="0"/>
+              <a:buChar char="•"/>
+              <a:defRPr sz="2400">
+                <a:solidFill>
+                  <a:schemeClr val="tx1"/>
+                </a:solidFill>
+                <a:latin typeface="Calibri" panose="020F0502020204030204" pitchFamily="34" charset="0"/>
+              </a:defRPr>
+            </a:lvl3pPr>
+            <a:lvl4pPr marL="1600200" indent="-228600">
+              <a:spcBef>
+                <a:spcPct val="20000"/>
+              </a:spcBef>
+              <a:buFont typeface="Arial" panose="020B0604020202020204" pitchFamily="34" charset="0"/>
+              <a:buChar char="–"/>
+              <a:defRPr sz="2000">
+                <a:solidFill>
+                  <a:schemeClr val="tx1"/>
+                </a:solidFill>
+                <a:latin typeface="Calibri" panose="020F0502020204030204" pitchFamily="34" charset="0"/>
+              </a:defRPr>
+            </a:lvl4pPr>
+            <a:lvl5pPr marL="2057400" indent="-228600">
+              <a:spcBef>
+                <a:spcPct val="20000"/>
+              </a:spcBef>
+              <a:buFont typeface="Arial" panose="020B0604020202020204" pitchFamily="34" charset="0"/>
+              <a:buChar char="»"/>
+              <a:defRPr sz="2000">
+                <a:solidFill>
+                  <a:schemeClr val="tx1"/>
+                </a:solidFill>
+                <a:latin typeface="Calibri" panose="020F0502020204030204" pitchFamily="34" charset="0"/>
+              </a:defRPr>
+            </a:lvl5pPr>
+            <a:lvl6pPr marL="2514600" indent="-228600" eaLnBrk="0" fontAlgn="base" hangingPunct="0">
+              <a:spcBef>
+                <a:spcPct val="20000"/>
+              </a:spcBef>
+              <a:spcAft>
+                <a:spcPct val="0"/>
+              </a:spcAft>
+              <a:buFont typeface="Arial" panose="020B0604020202020204" pitchFamily="34" charset="0"/>
+              <a:buChar char="»"/>
+              <a:defRPr sz="2000">
+                <a:solidFill>
+                  <a:schemeClr val="tx1"/>
+                </a:solidFill>
+                <a:latin typeface="Calibri" panose="020F0502020204030204" pitchFamily="34" charset="0"/>
+              </a:defRPr>
+            </a:lvl6pPr>
+            <a:lvl7pPr marL="2971800" indent="-228600" eaLnBrk="0" fontAlgn="base" hangingPunct="0">
+              <a:spcBef>
+                <a:spcPct val="20000"/>
+              </a:spcBef>
+              <a:spcAft>
+                <a:spcPct val="0"/>
+              </a:spcAft>
+              <a:buFont typeface="Arial" panose="020B0604020202020204" pitchFamily="34" charset="0"/>
+              <a:buChar char="»"/>
+              <a:defRPr sz="2000">
+                <a:solidFill>
+                  <a:schemeClr val="tx1"/>
+                </a:solidFill>
+                <a:latin typeface="Calibri" panose="020F0502020204030204" pitchFamily="34" charset="0"/>
+              </a:defRPr>
+            </a:lvl7pPr>
+            <a:lvl8pPr marL="3429000" indent="-228600" eaLnBrk="0" fontAlgn="base" hangingPunct="0">
+              <a:spcBef>
+                <a:spcPct val="20000"/>
+              </a:spcBef>
+              <a:spcAft>
+                <a:spcPct val="0"/>
+              </a:spcAft>
+              <a:buFont typeface="Arial" panose="020B0604020202020204" pitchFamily="34" charset="0"/>
+              <a:buChar char="»"/>
+              <a:defRPr sz="2000">
+                <a:solidFill>
+                  <a:schemeClr val="tx1"/>
+                </a:solidFill>
+                <a:latin typeface="Calibri" panose="020F0502020204030204" pitchFamily="34" charset="0"/>
+              </a:defRPr>
+            </a:lvl8pPr>
+            <a:lvl9pPr marL="3886200" indent="-228600" eaLnBrk="0" fontAlgn="base" hangingPunct="0">
+              <a:spcBef>
+                <a:spcPct val="20000"/>
+              </a:spcBef>
+              <a:spcAft>
+                <a:spcPct val="0"/>
+              </a:spcAft>
+              <a:buFont typeface="Arial" panose="020B0604020202020204" pitchFamily="34" charset="0"/>
+              <a:buChar char="»"/>
+              <a:defRPr sz="2000">
+                <a:solidFill>
+                  <a:schemeClr val="tx1"/>
+                </a:solidFill>
+                <a:latin typeface="Calibri" panose="020F0502020204030204" pitchFamily="34" charset="0"/>
+              </a:defRPr>
+            </a:lvl9pPr>
+          </a:lstStyle>
+          <a:p>
+            <a:pPr marL="257175" indent="-257175">
+              <a:spcBef>
+                <a:spcPct val="0"/>
+              </a:spcBef>
+            </a:pPr>
+            <a:r>
+              <a:rPr lang="en-US" altLang="en-US" sz="2800" dirty="0"/>
+              <a:t>Nonprofit partnership</a:t>
+            </a:r>
+          </a:p>
+          <a:p>
+            <a:pPr marL="814388" lvl="1" indent="-257175">
+              <a:spcBef>
+                <a:spcPct val="0"/>
+              </a:spcBef>
+            </a:pPr>
+            <a:r>
+              <a:rPr lang="en-US" altLang="en-US" dirty="0"/>
+              <a:t>Duke in North Carolina, USA</a:t>
+            </a:r>
+          </a:p>
+          <a:p>
+            <a:pPr marL="814388" lvl="1" indent="-257175">
+              <a:spcBef>
+                <a:spcPct val="0"/>
+              </a:spcBef>
+            </a:pPr>
+            <a:r>
+              <a:rPr lang="en-US" altLang="en-US" dirty="0"/>
+              <a:t>National University of Singapore (NUS)</a:t>
+            </a:r>
+          </a:p>
+          <a:p>
+            <a:pPr marL="814388" lvl="1" indent="-257175">
+              <a:spcBef>
+                <a:spcPct val="0"/>
+              </a:spcBef>
+            </a:pPr>
+            <a:r>
+              <a:rPr lang="en-US" altLang="en-US" dirty="0"/>
+              <a:t>SingHealth, largest public healthcare provider, 3 hospitals, 3,100 beds</a:t>
+            </a:r>
+          </a:p>
+          <a:p>
+            <a:pPr marL="257175" indent="-257175">
+              <a:spcBef>
+                <a:spcPct val="0"/>
+              </a:spcBef>
+            </a:pPr>
+            <a:r>
+              <a:rPr lang="en-US" altLang="en-US" sz="2800" dirty="0"/>
+              <a:t>60 MDs / year</a:t>
+            </a:r>
+          </a:p>
+          <a:p>
+            <a:pPr marL="257175" indent="-257175">
+              <a:spcBef>
+                <a:spcPct val="0"/>
+              </a:spcBef>
+            </a:pPr>
+            <a:r>
+              <a:rPr lang="en-US" altLang="en-US" sz="2800" dirty="0"/>
+              <a:t>15 PhD students / year</a:t>
+            </a:r>
+          </a:p>
+          <a:p>
+            <a:pPr marL="257175" indent="-257175">
+              <a:spcBef>
+                <a:spcPct val="0"/>
+              </a:spcBef>
+            </a:pPr>
+            <a:r>
+              <a:rPr lang="en-US" altLang="en-US" sz="2800" b="1" i="1" dirty="0"/>
+              <a:t>PhD program in </a:t>
+            </a:r>
+            <a:r>
+              <a:rPr lang="en-US" altLang="en-US" sz="2800" b="1" i="1" dirty="0" smtClean="0"/>
+              <a:t>quantitative biology </a:t>
+            </a:r>
+            <a:r>
+              <a:rPr lang="en-US" altLang="en-US" sz="2800" b="1" i="1" smtClean="0"/>
+              <a:t>and medicine: </a:t>
+            </a:r>
+            <a:endParaRPr lang="en-US" altLang="en-US" sz="2800" b="1" i="1" dirty="0"/>
+          </a:p>
+          <a:p>
+            <a:pPr eaLnBrk="1" hangingPunct="1">
+              <a:spcBef>
+                <a:spcPct val="0"/>
+              </a:spcBef>
+              <a:buNone/>
+            </a:pPr>
+            <a:r>
+              <a:rPr lang="en-US" altLang="en-US" sz="2800" b="1" i="1" dirty="0"/>
+              <a:t>      </a:t>
+            </a:r>
+            <a:r>
+              <a:rPr lang="en-US" sz="2800" dirty="0">
+                <a:hlinkClick r:id="rId4"/>
+              </a:rPr>
+              <a:t>https://www.duke-nus.edu.sg/education/our-programmes/phd/qbm-phd</a:t>
+            </a:r>
+            <a:endParaRPr lang="en-US" altLang="en-US" sz="2800" b="1" i="1" dirty="0"/>
+          </a:p>
+        </p:txBody>
+      </p:sp>
+    </p:spTree>
+    <p:extLst>
+      <p:ext uri="{BB962C8B-B14F-4D97-AF65-F5344CB8AC3E}">
+        <p14:creationId xmlns:p14="http://schemas.microsoft.com/office/powerpoint/2010/main" val="216334553"/>
+      </p:ext>
+    </p:extLst>
+  </p:cSld>
+  <p:clrMapOvr>
+    <a:masterClrMapping/>
+  </p:clrMapOvr>
+  <p:timing>
+    <p:tnLst>
+      <p:par>
+        <p:cTn id="1" dur="indefinite" restart="never" nodeType="tmRoot">
+          <p:childTnLst>
+            <p:seq concurrent="1" nextAc="seek">
+              <p:cTn id="2" dur="indefinite" nodeType="mainSeq">
+                <p:childTnLst>
+                  <p:par>
+                    <p:cTn id="3" fill="hold">
+                      <p:stCondLst>
+                        <p:cond delay="indefinite"/>
+                      </p:stCondLst>
+                      <p:childTnLst>
+                        <p:par>
+                          <p:cTn id="4" fill="hold">
+                            <p:stCondLst>
+                              <p:cond delay="0"/>
+                            </p:stCondLst>
+                            <p:childTnLst>
+                              <p:par>
+                                <p:cTn id="5" presetID="1" presetClass="entr" presetSubtype="0" fill="hold" grpId="0" nodeType="clickEffect">
+                                  <p:stCondLst>
+                                    <p:cond delay="0"/>
+                                  </p:stCondLst>
+                                  <p:childTnLst>
+                                    <p:set>
+                                      <p:cBhvr>
+                                        <p:cTn id="6" dur="1" fill="hold">
+                                          <p:stCondLst>
+                                            <p:cond delay="0"/>
+                                          </p:stCondLst>
+                                        </p:cTn>
+                                        <p:tgtEl>
+                                          <p:spTgt spid="7">
+                                            <p:txEl>
+                                              <p:pRg st="0" end="0"/>
+                                            </p:txEl>
+                                          </p:spTgt>
+                                        </p:tgtEl>
+                                        <p:attrNameLst>
+                                          <p:attrName>style.visibility</p:attrName>
+                                        </p:attrNameLst>
+                                      </p:cBhvr>
+                                      <p:to>
+                                        <p:strVal val="visible"/>
+                                      </p:to>
+                                    </p:set>
+                                  </p:childTnLst>
+                                </p:cTn>
+                              </p:par>
+                            </p:childTnLst>
+                          </p:cTn>
+                        </p:par>
+                      </p:childTnLst>
+                    </p:cTn>
+                  </p:par>
+                  <p:par>
+                    <p:cTn id="7" fill="hold">
+                      <p:stCondLst>
+                        <p:cond delay="indefinite"/>
+                      </p:stCondLst>
+                      <p:childTnLst>
+                        <p:par>
+                          <p:cTn id="8" fill="hold">
+                            <p:stCondLst>
+                              <p:cond delay="0"/>
+                            </p:stCondLst>
+                            <p:childTnLst>
+                              <p:par>
+                                <p:cTn id="9" presetID="1" presetClass="entr" presetSubtype="0" fill="hold" grpId="0" nodeType="clickEffect">
+                                  <p:stCondLst>
+                                    <p:cond delay="0"/>
+                                  </p:stCondLst>
+                                  <p:childTnLst>
+                                    <p:set>
+                                      <p:cBhvr>
+                                        <p:cTn id="10" dur="1" fill="hold">
+                                          <p:stCondLst>
+                                            <p:cond delay="0"/>
+                                          </p:stCondLst>
+                                        </p:cTn>
+                                        <p:tgtEl>
+                                          <p:spTgt spid="7">
+                                            <p:txEl>
+                                              <p:pRg st="1" end="1"/>
+                                            </p:txEl>
+                                          </p:spTgt>
+                                        </p:tgtEl>
+                                        <p:attrNameLst>
+                                          <p:attrName>style.visibility</p:attrName>
+                                        </p:attrNameLst>
+                                      </p:cBhvr>
+                                      <p:to>
+                                        <p:strVal val="visible"/>
+                                      </p:to>
+                                    </p:set>
+                                  </p:childTnLst>
+                                </p:cTn>
+                              </p:par>
+                            </p:childTnLst>
+                          </p:cTn>
+                        </p:par>
+                      </p:childTnLst>
+                    </p:cTn>
+                  </p:par>
+                  <p:par>
+                    <p:cTn id="11" fill="hold">
+                      <p:stCondLst>
+                        <p:cond delay="indefinite"/>
+                      </p:stCondLst>
+                      <p:childTnLst>
+                        <p:par>
+                          <p:cTn id="12" fill="hold">
+                            <p:stCondLst>
+                              <p:cond delay="0"/>
+                            </p:stCondLst>
+                            <p:childTnLst>
+                              <p:par>
+                                <p:cTn id="13" presetID="1" presetClass="entr" presetSubtype="0" fill="hold" grpId="0" nodeType="clickEffect">
+                                  <p:stCondLst>
+                                    <p:cond delay="0"/>
+                                  </p:stCondLst>
+                                  <p:childTnLst>
+                                    <p:set>
+                                      <p:cBhvr>
+                                        <p:cTn id="14" dur="1" fill="hold">
+                                          <p:stCondLst>
+                                            <p:cond delay="0"/>
+                                          </p:stCondLst>
+                                        </p:cTn>
+                                        <p:tgtEl>
+                                          <p:spTgt spid="7">
+                                            <p:txEl>
+                                              <p:pRg st="2" end="2"/>
+                                            </p:txEl>
+                                          </p:spTgt>
+                                        </p:tgtEl>
+                                        <p:attrNameLst>
+                                          <p:attrName>style.visibility</p:attrName>
+                                        </p:attrNameLst>
+                                      </p:cBhvr>
+                                      <p:to>
+                                        <p:strVal val="visible"/>
+                                      </p:to>
+                                    </p:set>
+                                  </p:childTnLst>
+                                </p:cTn>
+                              </p:par>
+                            </p:childTnLst>
+                          </p:cTn>
+                        </p:par>
+                      </p:childTnLst>
+                    </p:cTn>
+                  </p:par>
+                  <p:par>
+                    <p:cTn id="15" fill="hold">
+                      <p:stCondLst>
+                        <p:cond delay="indefinite"/>
+                      </p:stCondLst>
+                      <p:childTnLst>
+                        <p:par>
+                          <p:cTn id="16" fill="hold">
+                            <p:stCondLst>
+                              <p:cond delay="0"/>
+                            </p:stCondLst>
+                            <p:childTnLst>
+                              <p:par>
+                                <p:cTn id="17" presetID="1" presetClass="entr" presetSubtype="0" fill="hold" grpId="0" nodeType="clickEffect">
+                                  <p:stCondLst>
+                                    <p:cond delay="0"/>
+                                  </p:stCondLst>
+                                  <p:childTnLst>
+                                    <p:set>
+                                      <p:cBhvr>
+                                        <p:cTn id="18" dur="1" fill="hold">
+                                          <p:stCondLst>
+                                            <p:cond delay="0"/>
+                                          </p:stCondLst>
+                                        </p:cTn>
+                                        <p:tgtEl>
+                                          <p:spTgt spid="7">
+                                            <p:txEl>
+                                              <p:pRg st="3" end="3"/>
+                                            </p:txEl>
+                                          </p:spTgt>
+                                        </p:tgtEl>
+                                        <p:attrNameLst>
+                                          <p:attrName>style.visibility</p:attrName>
+                                        </p:attrNameLst>
+                                      </p:cBhvr>
+                                      <p:to>
+                                        <p:strVal val="visible"/>
+                                      </p:to>
+                                    </p:set>
+                                  </p:childTnLst>
+                                </p:cTn>
+                              </p:par>
+                            </p:childTnLst>
+                          </p:cTn>
+                        </p:par>
+                      </p:childTnLst>
+                    </p:cTn>
+                  </p:par>
+                  <p:par>
+                    <p:cTn id="19" fill="hold">
+                      <p:stCondLst>
+                        <p:cond delay="indefinite"/>
+                      </p:stCondLst>
+                      <p:childTnLst>
+                        <p:par>
+                          <p:cTn id="20" fill="hold">
+                            <p:stCondLst>
+                              <p:cond delay="0"/>
+                            </p:stCondLst>
+                            <p:childTnLst>
+                              <p:par>
+                                <p:cTn id="21" presetID="1" presetClass="entr" presetSubtype="0" fill="hold" grpId="0" nodeType="clickEffect">
+                                  <p:stCondLst>
+                                    <p:cond delay="0"/>
+                                  </p:stCondLst>
+                                  <p:childTnLst>
+                                    <p:set>
+                                      <p:cBhvr>
+                                        <p:cTn id="22" dur="1" fill="hold">
+                                          <p:stCondLst>
+                                            <p:cond delay="0"/>
+                                          </p:stCondLst>
+                                        </p:cTn>
+                                        <p:tgtEl>
+                                          <p:spTgt spid="7">
+                                            <p:txEl>
+                                              <p:pRg st="4" end="4"/>
+                                            </p:txEl>
+                                          </p:spTgt>
+                                        </p:tgtEl>
+                                        <p:attrNameLst>
+                                          <p:attrName>style.visibility</p:attrName>
+                                        </p:attrNameLst>
+                                      </p:cBhvr>
+                                      <p:to>
+                                        <p:strVal val="visible"/>
+                                      </p:to>
+                                    </p:set>
+                                  </p:childTnLst>
+                                </p:cTn>
+                              </p:par>
+                            </p:childTnLst>
+                          </p:cTn>
+                        </p:par>
+                      </p:childTnLst>
+                    </p:cTn>
+                  </p:par>
+                  <p:par>
+                    <p:cTn id="23" fill="hold">
+                      <p:stCondLst>
+                        <p:cond delay="indefinite"/>
+                      </p:stCondLst>
+                      <p:childTnLst>
+                        <p:par>
+                          <p:cTn id="24" fill="hold">
+                            <p:stCondLst>
+                              <p:cond delay="0"/>
+                            </p:stCondLst>
+                            <p:childTnLst>
+                              <p:par>
+                                <p:cTn id="25" presetID="1" presetClass="entr" presetSubtype="0" fill="hold" grpId="0" nodeType="clickEffect">
+                                  <p:stCondLst>
+                                    <p:cond delay="0"/>
+                                  </p:stCondLst>
+                                  <p:childTnLst>
+                                    <p:set>
+                                      <p:cBhvr>
+                                        <p:cTn id="26" dur="1" fill="hold">
+                                          <p:stCondLst>
+                                            <p:cond delay="0"/>
+                                          </p:stCondLst>
+                                        </p:cTn>
+                                        <p:tgtEl>
+                                          <p:spTgt spid="7">
+                                            <p:txEl>
+                                              <p:pRg st="5" end="5"/>
+                                            </p:txEl>
+                                          </p:spTgt>
+                                        </p:tgtEl>
+                                        <p:attrNameLst>
+                                          <p:attrName>style.visibility</p:attrName>
+                                        </p:attrNameLst>
+                                      </p:cBhvr>
+                                      <p:to>
+                                        <p:strVal val="visible"/>
+                                      </p:to>
+                                    </p:set>
+                                  </p:childTnLst>
+                                </p:cTn>
+                              </p:par>
+                            </p:childTnLst>
+                          </p:cTn>
+                        </p:par>
+                      </p:childTnLst>
+                    </p:cTn>
+                  </p:par>
+                  <p:par>
+                    <p:cTn id="27" fill="hold">
+                      <p:stCondLst>
+                        <p:cond delay="indefinite"/>
+                      </p:stCondLst>
+                      <p:childTnLst>
+                        <p:par>
+                          <p:cTn id="28" fill="hold">
+                            <p:stCondLst>
+                              <p:cond delay="0"/>
+                            </p:stCondLst>
+                            <p:childTnLst>
+                              <p:par>
+                                <p:cTn id="29" presetID="1" presetClass="entr" presetSubtype="0" fill="hold" grpId="0" nodeType="clickEffect">
+                                  <p:stCondLst>
+                                    <p:cond delay="0"/>
+                                  </p:stCondLst>
+                                  <p:childTnLst>
+                                    <p:set>
+                                      <p:cBhvr>
+                                        <p:cTn id="30" dur="1" fill="hold">
+                                          <p:stCondLst>
+                                            <p:cond delay="0"/>
+                                          </p:stCondLst>
+                                        </p:cTn>
+                                        <p:tgtEl>
+                                          <p:spTgt spid="7">
+                                            <p:txEl>
+                                              <p:pRg st="6" end="6"/>
+                                            </p:txEl>
+                                          </p:spTgt>
+                                        </p:tgtEl>
+                                        <p:attrNameLst>
+                                          <p:attrName>style.visibility</p:attrName>
+                                        </p:attrNameLst>
+                                      </p:cBhvr>
+                                      <p:to>
+                                        <p:strVal val="visible"/>
+                                      </p:to>
+                                    </p:set>
+                                  </p:childTnLst>
+                                </p:cTn>
+                              </p:par>
+                            </p:childTnLst>
+                          </p:cTn>
+                        </p:par>
+                      </p:childTnLst>
+                    </p:cTn>
+                  </p:par>
+                  <p:par>
+                    <p:cTn id="31" fill="hold">
+                      <p:stCondLst>
+                        <p:cond delay="indefinite"/>
+                      </p:stCondLst>
+                      <p:childTnLst>
+                        <p:par>
+                          <p:cTn id="32" fill="hold">
+                            <p:stCondLst>
+                              <p:cond delay="0"/>
+                            </p:stCondLst>
+                            <p:childTnLst>
+                              <p:par>
+                                <p:cTn id="33" presetID="1" presetClass="entr" presetSubtype="0" fill="hold" grpId="0" nodeType="clickEffect">
+                                  <p:stCondLst>
+                                    <p:cond delay="0"/>
+                                  </p:stCondLst>
+                                  <p:childTnLst>
+                                    <p:set>
+                                      <p:cBhvr>
+                                        <p:cTn id="34" dur="1" fill="hold">
+                                          <p:stCondLst>
+                                            <p:cond delay="0"/>
+                                          </p:stCondLst>
+                                        </p:cTn>
+                                        <p:tgtEl>
+                                          <p:spTgt spid="7">
+                                            <p:txEl>
+                                              <p:pRg st="7" end="7"/>
+                                            </p:txEl>
+                                          </p:spTgt>
+                                        </p:tgtEl>
+                                        <p:attrNameLst>
+                                          <p:attrName>style.visibility</p:attrName>
+                                        </p:attrNameLst>
+                                      </p:cBhvr>
+                                      <p:to>
+                                        <p:strVal val="visible"/>
+                                      </p:to>
+                                    </p:set>
+                                  </p:childTnLst>
+                                </p:cTn>
+                              </p:par>
+                            </p:childTnLst>
+                          </p:cTn>
+                        </p:par>
+                      </p:childTnLst>
+                    </p:cTn>
+                  </p:par>
+                </p:childTnLst>
+              </p:cTn>
+              <p:prevCondLst>
+                <p:cond evt="onPrev" delay="0">
+                  <p:tgtEl>
+                    <p:sldTgt/>
+                  </p:tgtEl>
+                </p:cond>
+              </p:prevCondLst>
+              <p:nextCondLst>
+                <p:cond evt="onNext" delay="0">
+                  <p:tgtEl>
+                    <p:sldTgt/>
+                  </p:tgtEl>
+                </p:cond>
+              </p:nextCondLst>
+            </p:seq>
+          </p:childTnLst>
+        </p:cTn>
+      </p:par>
+    </p:tnLst>
+    <p:bldLst>
+      <p:bldP spid="7" grpId="0" build="p" bldLvl="2"/>
+    </p:bldLst>
+  </p:timing>
+</p:sld>
+</file>
+
+<file path=ppt/slides/slide11.xml><?xml version="1.0" encoding="utf-8"?>
+<p:sld xmlns:a="http://schemas.openxmlformats.org/drawingml/2006/main" xmlns:r="http://schemas.openxmlformats.org/officeDocument/2006/relationships" xmlns:p="http://schemas.openxmlformats.org/presentationml/2006/main">
+  <p:cSld>
+    <p:spTree>
+      <p:nvGrpSpPr>
+        <p:cNvPr id="1" name=""/>
+        <p:cNvGrpSpPr/>
+        <p:nvPr/>
+      </p:nvGrpSpPr>
+      <p:grpSpPr>
+        <a:xfrm>
+          <a:off x="0" y="0"/>
+          <a:ext cx="0" cy="0"/>
+          <a:chOff x="0" y="0"/>
+          <a:chExt cx="0" cy="0"/>
+        </a:xfrm>
+      </p:grpSpPr>
+      <p:sp>
+        <p:nvSpPr>
+          <p:cNvPr id="3" name="Subtitle 5"/>
+          <p:cNvSpPr txBox="1">
+            <a:spLocks/>
+          </p:cNvSpPr>
+          <p:nvPr/>
+        </p:nvSpPr>
+        <p:spPr>
+          <a:xfrm>
+            <a:off x="711200" y="333274"/>
+            <a:ext cx="11017956" cy="6276370"/>
+          </a:xfrm>
+          <a:prstGeom prst="rect">
+            <a:avLst/>
+          </a:prstGeom>
+        </p:spPr>
+        <p:txBody>
+          <a:bodyPr vert="horz" lIns="91440" tIns="45720" rIns="91440" bIns="45720" rtlCol="0">
+            <a:normAutofit/>
+          </a:bodyPr>
+          <a:lstStyle>
+            <a:lvl1pPr marL="0" indent="0" algn="ctr" defTabSz="914400" rtl="0" eaLnBrk="1" latinLnBrk="0" hangingPunct="1">
+              <a:lnSpc>
+                <a:spcPct val="90000"/>
+              </a:lnSpc>
+              <a:spcBef>
+                <a:spcPts val="1000"/>
+              </a:spcBef>
+              <a:buFont typeface="Arial" panose="020B0604020202020204" pitchFamily="34" charset="0"/>
+              <a:buNone/>
+              <a:defRPr sz="2400" kern="1200">
+                <a:solidFill>
+                  <a:schemeClr val="tx1"/>
+                </a:solidFill>
+                <a:latin typeface="+mn-lt"/>
+                <a:ea typeface="+mn-ea"/>
+                <a:cs typeface="+mn-cs"/>
+              </a:defRPr>
+            </a:lvl1pPr>
+            <a:lvl2pPr marL="457200" indent="0" algn="ctr" defTabSz="914400" rtl="0" eaLnBrk="1" latinLnBrk="0" hangingPunct="1">
+              <a:lnSpc>
+                <a:spcPct val="90000"/>
+              </a:lnSpc>
+              <a:spcBef>
+                <a:spcPts val="500"/>
+              </a:spcBef>
+              <a:buFont typeface="Arial" panose="020B0604020202020204" pitchFamily="34" charset="0"/>
+              <a:buNone/>
+              <a:defRPr sz="2000" kern="1200">
+                <a:solidFill>
+                  <a:schemeClr val="tx1"/>
+                </a:solidFill>
+                <a:latin typeface="+mn-lt"/>
+                <a:ea typeface="+mn-ea"/>
+                <a:cs typeface="+mn-cs"/>
+              </a:defRPr>
+            </a:lvl2pPr>
+            <a:lvl3pPr marL="914400" indent="0" algn="ctr" defTabSz="914400" rtl="0" eaLnBrk="1" latinLnBrk="0" hangingPunct="1">
+              <a:lnSpc>
+                <a:spcPct val="90000"/>
+              </a:lnSpc>
+              <a:spcBef>
+                <a:spcPts val="500"/>
+              </a:spcBef>
+              <a:buFont typeface="Arial" panose="020B0604020202020204" pitchFamily="34" charset="0"/>
+              <a:buNone/>
+              <a:defRPr sz="1800" kern="1200">
+                <a:solidFill>
+                  <a:schemeClr val="tx1"/>
+                </a:solidFill>
+                <a:latin typeface="+mn-lt"/>
+                <a:ea typeface="+mn-ea"/>
+                <a:cs typeface="+mn-cs"/>
+              </a:defRPr>
+            </a:lvl3pPr>
+            <a:lvl4pPr marL="1371600" indent="0" algn="ctr" defTabSz="914400" rtl="0" eaLnBrk="1" latinLnBrk="0" hangingPunct="1">
+              <a:lnSpc>
+                <a:spcPct val="90000"/>
+              </a:lnSpc>
+              <a:spcBef>
+                <a:spcPts val="500"/>
+              </a:spcBef>
+              <a:buFont typeface="Arial" panose="020B0604020202020204" pitchFamily="34" charset="0"/>
+              <a:buNone/>
+              <a:defRPr sz="1600" kern="1200">
+                <a:solidFill>
+                  <a:schemeClr val="tx1"/>
+                </a:solidFill>
+                <a:latin typeface="+mn-lt"/>
+                <a:ea typeface="+mn-ea"/>
+                <a:cs typeface="+mn-cs"/>
+              </a:defRPr>
+            </a:lvl4pPr>
+            <a:lvl5pPr marL="1828800" indent="0" algn="ctr" defTabSz="914400" rtl="0" eaLnBrk="1" latinLnBrk="0" hangingPunct="1">
+              <a:lnSpc>
+                <a:spcPct val="90000"/>
+              </a:lnSpc>
+              <a:spcBef>
+                <a:spcPts val="500"/>
+              </a:spcBef>
+              <a:buFont typeface="Arial" panose="020B0604020202020204" pitchFamily="34" charset="0"/>
+              <a:buNone/>
+              <a:defRPr sz="1600" kern="1200">
+                <a:solidFill>
+                  <a:schemeClr val="tx1"/>
+                </a:solidFill>
+                <a:latin typeface="+mn-lt"/>
+                <a:ea typeface="+mn-ea"/>
+                <a:cs typeface="+mn-cs"/>
+              </a:defRPr>
+            </a:lvl5pPr>
+            <a:lvl6pPr marL="2286000" indent="0" algn="ctr" defTabSz="914400" rtl="0" eaLnBrk="1" latinLnBrk="0" hangingPunct="1">
+              <a:lnSpc>
+                <a:spcPct val="90000"/>
+              </a:lnSpc>
+              <a:spcBef>
+                <a:spcPts val="500"/>
+              </a:spcBef>
+              <a:buFont typeface="Arial" panose="020B0604020202020204" pitchFamily="34" charset="0"/>
+              <a:buNone/>
+              <a:defRPr sz="1600" kern="1200">
+                <a:solidFill>
+                  <a:schemeClr val="tx1"/>
+                </a:solidFill>
+                <a:latin typeface="+mn-lt"/>
+                <a:ea typeface="+mn-ea"/>
+                <a:cs typeface="+mn-cs"/>
+              </a:defRPr>
+            </a:lvl6pPr>
+            <a:lvl7pPr marL="2743200" indent="0" algn="ctr" defTabSz="914400" rtl="0" eaLnBrk="1" latinLnBrk="0" hangingPunct="1">
+              <a:lnSpc>
+                <a:spcPct val="90000"/>
+              </a:lnSpc>
+              <a:spcBef>
+                <a:spcPts val="500"/>
+              </a:spcBef>
+              <a:buFont typeface="Arial" panose="020B0604020202020204" pitchFamily="34" charset="0"/>
+              <a:buNone/>
+              <a:defRPr sz="1600" kern="1200">
+                <a:solidFill>
+                  <a:schemeClr val="tx1"/>
+                </a:solidFill>
+                <a:latin typeface="+mn-lt"/>
+                <a:ea typeface="+mn-ea"/>
+                <a:cs typeface="+mn-cs"/>
+              </a:defRPr>
+            </a:lvl7pPr>
+            <a:lvl8pPr marL="3200400" indent="0" algn="ctr" defTabSz="914400" rtl="0" eaLnBrk="1" latinLnBrk="0" hangingPunct="1">
+              <a:lnSpc>
+                <a:spcPct val="90000"/>
+              </a:lnSpc>
+              <a:spcBef>
+                <a:spcPts val="500"/>
+              </a:spcBef>
+              <a:buFont typeface="Arial" panose="020B0604020202020204" pitchFamily="34" charset="0"/>
+              <a:buNone/>
+              <a:defRPr sz="1600" kern="1200">
+                <a:solidFill>
+                  <a:schemeClr val="tx1"/>
+                </a:solidFill>
+                <a:latin typeface="+mn-lt"/>
+                <a:ea typeface="+mn-ea"/>
+                <a:cs typeface="+mn-cs"/>
+              </a:defRPr>
+            </a:lvl8pPr>
+            <a:lvl9pPr marL="3657600" indent="0" algn="ctr" defTabSz="914400" rtl="0" eaLnBrk="1" latinLnBrk="0" hangingPunct="1">
+              <a:lnSpc>
+                <a:spcPct val="90000"/>
+              </a:lnSpc>
+              <a:spcBef>
+                <a:spcPts val="500"/>
+              </a:spcBef>
+              <a:buFont typeface="Arial" panose="020B0604020202020204" pitchFamily="34" charset="0"/>
+              <a:buNone/>
+              <a:defRPr sz="1600" kern="1200">
+                <a:solidFill>
+                  <a:schemeClr val="tx1"/>
+                </a:solidFill>
+                <a:latin typeface="+mn-lt"/>
+                <a:ea typeface="+mn-ea"/>
+                <a:cs typeface="+mn-cs"/>
+              </a:defRPr>
+            </a:lvl9pPr>
+          </a:lstStyle>
+          <a:p>
+            <a:pPr algn="l">
+              <a:lnSpc>
+                <a:spcPct val="100000"/>
+              </a:lnSpc>
+              <a:spcBef>
+                <a:spcPts val="0"/>
+              </a:spcBef>
+              <a:defRPr/>
+            </a:pPr>
+            <a:r>
+              <a:rPr lang="en-US" sz="4400" dirty="0" smtClean="0"/>
+              <a:t>Arnoud Boot</a:t>
+            </a:r>
+          </a:p>
+          <a:p>
+            <a:pPr algn="l">
+              <a:lnSpc>
+                <a:spcPct val="100000"/>
+              </a:lnSpc>
+              <a:spcBef>
+                <a:spcPts val="0"/>
+              </a:spcBef>
+              <a:defRPr/>
+            </a:pPr>
+            <a:endParaRPr lang="en-US" dirty="0"/>
+          </a:p>
+          <a:p>
+            <a:pPr algn="l">
+              <a:lnSpc>
+                <a:spcPct val="100000"/>
+              </a:lnSpc>
+              <a:spcBef>
+                <a:spcPts val="0"/>
+              </a:spcBef>
+              <a:defRPr/>
+            </a:pPr>
+            <a:r>
+              <a:rPr lang="en-US" dirty="0" smtClean="0"/>
+              <a:t>Interests: Functional genomics; combining bioinformatics tools with wet-lab experiments to study mechanisms underlying tumorigenesis</a:t>
+            </a:r>
+          </a:p>
+          <a:p>
+            <a:pPr marL="1257300" lvl="2" indent="-342900" algn="l">
+              <a:lnSpc>
+                <a:spcPct val="100000"/>
+              </a:lnSpc>
+              <a:spcBef>
+                <a:spcPts val="0"/>
+              </a:spcBef>
+              <a:buFont typeface="Arial" panose="020B0604020202020204" pitchFamily="34" charset="0"/>
+              <a:buChar char="•"/>
+              <a:defRPr/>
+            </a:pPr>
+            <a:r>
+              <a:rPr lang="en-US" sz="2000" dirty="0"/>
+              <a:t>Mutagenesis</a:t>
+            </a:r>
+          </a:p>
+          <a:p>
+            <a:pPr marL="1257300" lvl="2" indent="-342900" algn="l">
+              <a:lnSpc>
+                <a:spcPct val="100000"/>
+              </a:lnSpc>
+              <a:spcBef>
+                <a:spcPts val="0"/>
+              </a:spcBef>
+              <a:buFont typeface="Arial" panose="020B0604020202020204" pitchFamily="34" charset="0"/>
+              <a:buChar char="•"/>
+              <a:defRPr/>
+            </a:pPr>
+            <a:r>
+              <a:rPr lang="en-US" sz="2000" dirty="0" smtClean="0"/>
+              <a:t>DNA repair and maintenance</a:t>
+            </a:r>
+          </a:p>
+          <a:p>
+            <a:pPr marL="1257300" lvl="2" indent="-342900" algn="l">
+              <a:lnSpc>
+                <a:spcPct val="100000"/>
+              </a:lnSpc>
+              <a:spcBef>
+                <a:spcPts val="0"/>
+              </a:spcBef>
+              <a:buFont typeface="Arial" panose="020B0604020202020204" pitchFamily="34" charset="0"/>
+              <a:buChar char="•"/>
+              <a:defRPr/>
+            </a:pPr>
+            <a:r>
+              <a:rPr lang="en-US" sz="2000" dirty="0" smtClean="0"/>
+              <a:t>Epigenetics</a:t>
+            </a:r>
+            <a:endParaRPr lang="en-US" sz="2000" dirty="0"/>
+          </a:p>
+          <a:p>
+            <a:pPr algn="l">
+              <a:lnSpc>
+                <a:spcPct val="100000"/>
+              </a:lnSpc>
+              <a:spcBef>
+                <a:spcPts val="0"/>
+              </a:spcBef>
+              <a:defRPr/>
+            </a:pPr>
+            <a:endParaRPr lang="en-US" dirty="0"/>
+          </a:p>
+          <a:p>
+            <a:pPr algn="l">
+              <a:lnSpc>
+                <a:spcPct val="100000"/>
+              </a:lnSpc>
+              <a:spcBef>
+                <a:spcPts val="0"/>
+              </a:spcBef>
+              <a:defRPr/>
+            </a:pPr>
+            <a:r>
+              <a:rPr lang="en-US" dirty="0" smtClean="0"/>
+              <a:t>Research contributions to the field of mutational signatures:</a:t>
+            </a:r>
+          </a:p>
+          <a:p>
+            <a:pPr algn="l">
+              <a:lnSpc>
+                <a:spcPct val="100000"/>
+              </a:lnSpc>
+              <a:spcBef>
+                <a:spcPts val="0"/>
+              </a:spcBef>
+              <a:defRPr/>
+            </a:pPr>
+            <a:endParaRPr lang="en-US" sz="2000" dirty="0" smtClean="0"/>
+          </a:p>
+          <a:p>
+            <a:pPr algn="l">
+              <a:lnSpc>
+                <a:spcPct val="100000"/>
+              </a:lnSpc>
+              <a:spcBef>
+                <a:spcPts val="0"/>
+              </a:spcBef>
+              <a:defRPr/>
+            </a:pPr>
+            <a:r>
+              <a:rPr lang="en-US" sz="2000" dirty="0" smtClean="0"/>
+              <a:t>First to describe the mutational signatures of:</a:t>
+            </a:r>
+          </a:p>
+          <a:p>
+            <a:pPr marL="1485900" lvl="2" indent="-571500" algn="l">
+              <a:lnSpc>
+                <a:spcPct val="100000"/>
+              </a:lnSpc>
+              <a:spcBef>
+                <a:spcPts val="0"/>
+              </a:spcBef>
+              <a:buFont typeface="Arial" panose="020B0604020202020204" pitchFamily="34" charset="0"/>
+              <a:buChar char="•"/>
+              <a:defRPr/>
+            </a:pPr>
+            <a:r>
+              <a:rPr lang="en-US" sz="2000" dirty="0" smtClean="0"/>
+              <a:t>Cisplatin (Boot et al., </a:t>
+            </a:r>
+            <a:r>
+              <a:rPr lang="en-US" sz="2000" dirty="0" err="1" smtClean="0"/>
+              <a:t>Gen.Res</a:t>
+            </a:r>
+            <a:r>
+              <a:rPr lang="en-US" sz="2000" dirty="0" smtClean="0"/>
+              <a:t>, 2018)</a:t>
+            </a:r>
+          </a:p>
+          <a:p>
+            <a:pPr marL="1485900" lvl="2" indent="-571500" algn="l">
+              <a:lnSpc>
+                <a:spcPct val="100000"/>
+              </a:lnSpc>
+              <a:spcBef>
+                <a:spcPts val="0"/>
+              </a:spcBef>
+              <a:buFont typeface="Arial" panose="020B0604020202020204" pitchFamily="34" charset="0"/>
+              <a:buChar char="•"/>
+              <a:defRPr/>
+            </a:pPr>
+            <a:r>
+              <a:rPr lang="en-US" sz="2000" dirty="0" smtClean="0"/>
+              <a:t>Colibactin</a:t>
+            </a:r>
+            <a:r>
+              <a:rPr lang="en-US" sz="2000" dirty="0"/>
+              <a:t> (Boot et al., </a:t>
+            </a:r>
+            <a:r>
+              <a:rPr lang="en-US" sz="2000" dirty="0" err="1"/>
+              <a:t>Gen.Res</a:t>
+            </a:r>
+            <a:r>
+              <a:rPr lang="en-US" sz="2000" dirty="0"/>
+              <a:t>, </a:t>
+            </a:r>
+            <a:r>
+              <a:rPr lang="en-US" sz="2000" dirty="0" smtClean="0"/>
+              <a:t>2020)</a:t>
+            </a:r>
+          </a:p>
+          <a:p>
+            <a:pPr marL="1485900" lvl="2" indent="-571500" algn="l">
+              <a:lnSpc>
+                <a:spcPct val="100000"/>
+              </a:lnSpc>
+              <a:spcBef>
+                <a:spcPts val="0"/>
+              </a:spcBef>
+              <a:buFont typeface="Arial" panose="020B0604020202020204" pitchFamily="34" charset="0"/>
+              <a:buChar char="•"/>
+              <a:defRPr/>
+            </a:pPr>
+            <a:r>
+              <a:rPr lang="en-US" sz="2000" dirty="0" smtClean="0"/>
+              <a:t>TOP2A p.K743N (Boot et al., bioRxiv, 2020)</a:t>
+            </a:r>
+          </a:p>
+          <a:p>
+            <a:pPr algn="l">
+              <a:lnSpc>
+                <a:spcPct val="100000"/>
+              </a:lnSpc>
+              <a:spcBef>
+                <a:spcPts val="0"/>
+              </a:spcBef>
+              <a:defRPr/>
+            </a:pPr>
+            <a:r>
+              <a:rPr lang="en-US" sz="2000" dirty="0" smtClean="0"/>
+              <a:t>Also contributed to </a:t>
+            </a:r>
+          </a:p>
+          <a:p>
+            <a:pPr marL="1257300" lvl="2" indent="-342900" algn="l">
+              <a:lnSpc>
+                <a:spcPct val="100000"/>
+              </a:lnSpc>
+              <a:spcBef>
+                <a:spcPts val="0"/>
+              </a:spcBef>
+              <a:buFont typeface="Arial" panose="020B0604020202020204" pitchFamily="34" charset="0"/>
+              <a:buChar char="•"/>
+              <a:defRPr/>
+            </a:pPr>
+            <a:r>
+              <a:rPr lang="en-US" sz="2000" dirty="0" smtClean="0"/>
+              <a:t>    Aflatoxin B1 (Huang et al., </a:t>
+            </a:r>
+            <a:r>
+              <a:rPr lang="en-US" sz="2000" dirty="0" err="1" smtClean="0"/>
+              <a:t>Gen.Res</a:t>
+            </a:r>
+            <a:r>
+              <a:rPr lang="en-US" sz="2000" dirty="0" smtClean="0"/>
+              <a:t>, 2017)</a:t>
+            </a:r>
+          </a:p>
+          <a:p>
+            <a:pPr marL="1485900" lvl="2" indent="-571500" algn="l">
+              <a:lnSpc>
+                <a:spcPct val="100000"/>
+              </a:lnSpc>
+              <a:spcBef>
+                <a:spcPts val="0"/>
+              </a:spcBef>
+              <a:buFont typeface="Arial" panose="020B0604020202020204" pitchFamily="34" charset="0"/>
+              <a:buChar char="•"/>
+              <a:defRPr/>
+            </a:pPr>
+            <a:r>
+              <a:rPr lang="en-US" sz="2000" dirty="0" smtClean="0"/>
+              <a:t>Aristolochic acid (Ng et al., STM, 2017)</a:t>
+            </a:r>
+          </a:p>
+          <a:p>
+            <a:pPr marL="1485900" lvl="2" indent="-571500" algn="l">
+              <a:lnSpc>
+                <a:spcPct val="100000"/>
+              </a:lnSpc>
+              <a:spcBef>
+                <a:spcPts val="0"/>
+              </a:spcBef>
+              <a:buFont typeface="Arial" panose="020B0604020202020204" pitchFamily="34" charset="0"/>
+              <a:buChar char="•"/>
+              <a:defRPr/>
+            </a:pPr>
+            <a:r>
+              <a:rPr lang="en-US" sz="2000" dirty="0" smtClean="0"/>
+              <a:t>Pan Cancer Analysis of Whole Genomes (Alexandrov et al., Nature, 2020)</a:t>
+            </a:r>
+          </a:p>
+        </p:txBody>
+      </p:sp>
+    </p:spTree>
+    <p:extLst>
+      <p:ext uri="{BB962C8B-B14F-4D97-AF65-F5344CB8AC3E}">
+        <p14:creationId xmlns:p14="http://schemas.microsoft.com/office/powerpoint/2010/main" val="469403673"/>
+      </p:ext>
+    </p:extLst>
+  </p:cSld>
+  <p:clrMapOvr>
+    <a:masterClrMapping/>
+  </p:clrMapOvr>
+</p:sld>
+</file>
+
+<file path=ppt/slides/slide12.xml><?xml version="1.0" encoding="utf-8"?>
+<p:sld xmlns:a="http://schemas.openxmlformats.org/drawingml/2006/main" xmlns:r="http://schemas.openxmlformats.org/officeDocument/2006/relationships" xmlns:p="http://schemas.openxmlformats.org/presentationml/2006/main">
+  <p:cSld>
+    <p:spTree>
+      <p:nvGrpSpPr>
+        <p:cNvPr id="1" name=""/>
+        <p:cNvGrpSpPr/>
+        <p:nvPr/>
+      </p:nvGrpSpPr>
+      <p:grpSpPr>
+        <a:xfrm>
+          <a:off x="0" y="0"/>
+          <a:ext cx="0" cy="0"/>
+          <a:chOff x="0" y="0"/>
+          <a:chExt cx="0" cy="0"/>
+        </a:xfrm>
+      </p:grpSpPr>
+      <p:sp>
+        <p:nvSpPr>
+          <p:cNvPr id="2" name="Title 1"/>
+          <p:cNvSpPr>
+            <a:spLocks noGrp="1"/>
+          </p:cNvSpPr>
+          <p:nvPr>
+            <p:ph type="title"/>
+          </p:nvPr>
+        </p:nvSpPr>
+        <p:spPr>
+          <a:xfrm>
+            <a:off x="533400" y="152400"/>
+            <a:ext cx="10972800" cy="563562"/>
+          </a:xfrm>
+        </p:spPr>
+        <p:txBody>
+          <a:bodyPr>
+            <a:normAutofit fontScale="90000"/>
+          </a:bodyPr>
+          <a:lstStyle/>
+          <a:p>
+            <a:pPr algn="l"/>
+            <a:r>
+              <a:rPr lang="en-US" dirty="0" smtClean="0"/>
+              <a:t>Steve Rozen</a:t>
+            </a:r>
+            <a:endParaRPr lang="en-US" dirty="0"/>
+          </a:p>
+        </p:txBody>
+      </p:sp>
+      <p:sp>
+        <p:nvSpPr>
+          <p:cNvPr id="4" name="Content Placeholder 3"/>
+          <p:cNvSpPr>
+            <a:spLocks noGrp="1"/>
+          </p:cNvSpPr>
+          <p:nvPr>
+            <p:ph idx="1"/>
+          </p:nvPr>
+        </p:nvSpPr>
+        <p:spPr>
+          <a:xfrm>
+            <a:off x="457200" y="1143000"/>
+            <a:ext cx="10972800" cy="5223424"/>
+          </a:xfrm>
+        </p:spPr>
+        <p:txBody>
+          <a:bodyPr>
+            <a:normAutofit lnSpcReduction="10000"/>
+          </a:bodyPr>
+          <a:lstStyle/>
+          <a:p>
+            <a:r>
+              <a:rPr lang="en-US" sz="2800" dirty="0" smtClean="0"/>
+              <a:t>Undergrad degree in performing arts</a:t>
+            </a:r>
+          </a:p>
+          <a:p>
+            <a:r>
+              <a:rPr lang="en-US" sz="2800" dirty="0" smtClean="0"/>
+              <a:t>Concluded it wasn’t viable (and not very interesting and I wasn’t very talented)</a:t>
+            </a:r>
+          </a:p>
+          <a:p>
+            <a:r>
+              <a:rPr lang="en-US" sz="2800" dirty="0" smtClean="0"/>
+              <a:t>Got a masters in computer science</a:t>
+            </a:r>
+          </a:p>
+          <a:p>
+            <a:r>
+              <a:rPr lang="en-US" sz="2800" dirty="0" smtClean="0"/>
+              <a:t>Worked on Wall Street for 2 years</a:t>
+            </a:r>
+          </a:p>
+          <a:p>
+            <a:r>
+              <a:rPr lang="en-US" sz="2800" dirty="0" smtClean="0"/>
+              <a:t>Got a PhD in computer science (the dumb way, part time)</a:t>
+            </a:r>
+          </a:p>
+          <a:p>
+            <a:r>
+              <a:rPr lang="en-US" sz="2800" dirty="0" smtClean="0"/>
+              <a:t>Was not willing to relocate for a faculty job in computer science for family reasons, so went to work for Eric Lander at a “genome center</a:t>
+            </a:r>
+            <a:r>
+              <a:rPr lang="en-US" sz="2800" dirty="0" smtClean="0"/>
+              <a:t>”</a:t>
+            </a:r>
+          </a:p>
+          <a:p>
+            <a:r>
+              <a:rPr lang="en-US" dirty="0"/>
+              <a:t>Helped sequence the human and mouse genomes (small role in huge international effort)</a:t>
+            </a:r>
+          </a:p>
+          <a:p>
+            <a:r>
+              <a:rPr lang="en-US" dirty="0"/>
+              <a:t>Wrote the Primer3 software and web interface (with Helen Skaletsky), cited by 20,000  papers</a:t>
+            </a:r>
+          </a:p>
+          <a:p>
+            <a:endParaRPr lang="en-US" sz="2800" dirty="0" smtClean="0"/>
+          </a:p>
+          <a:p>
+            <a:pPr marL="0" indent="0">
+              <a:buNone/>
+            </a:pPr>
+            <a:endParaRPr lang="en-US" sz="2800" dirty="0"/>
+          </a:p>
+        </p:txBody>
+      </p:sp>
+      <p:sp>
+        <p:nvSpPr>
+          <p:cNvPr id="3" name="Slide Number Placeholder 2"/>
+          <p:cNvSpPr>
+            <a:spLocks noGrp="1"/>
+          </p:cNvSpPr>
+          <p:nvPr>
+            <p:ph type="sldNum" sz="quarter" idx="12"/>
+          </p:nvPr>
+        </p:nvSpPr>
+        <p:spPr/>
+        <p:txBody>
+          <a:bodyPr/>
+          <a:lstStyle/>
+          <a:p>
+            <a:pPr>
+              <a:defRPr/>
+            </a:pPr>
+            <a:fld id="{47EB465D-2B07-4782-9D38-CDF7B0E66DA7}" type="slidenum">
+              <a:rPr lang="en-US" smtClean="0"/>
+              <a:pPr>
+                <a:defRPr/>
+              </a:pPr>
+              <a:t>12</a:t>
+            </a:fld>
+            <a:endParaRPr lang="en-US"/>
+          </a:p>
+        </p:txBody>
+      </p:sp>
+    </p:spTree>
+    <p:extLst>
+      <p:ext uri="{BB962C8B-B14F-4D97-AF65-F5344CB8AC3E}">
+        <p14:creationId xmlns:p14="http://schemas.microsoft.com/office/powerpoint/2010/main" val="644911874"/>
+      </p:ext>
+    </p:extLst>
+  </p:cSld>
+  <p:clrMapOvr>
+    <a:masterClrMapping/>
+  </p:clrMapOvr>
+  <p:timing>
+    <p:tnLst>
+      <p:par>
+        <p:cTn id="1" dur="indefinite" restart="never" nodeType="tmRoot">
+          <p:childTnLst>
+            <p:seq concurrent="1" nextAc="seek">
+              <p:cTn id="2" dur="indefinite" nodeType="mainSeq">
+                <p:childTnLst>
+                  <p:par>
+                    <p:cTn id="3" fill="hold">
+                      <p:stCondLst>
+                        <p:cond delay="indefinite"/>
+                      </p:stCondLst>
+                      <p:childTnLst>
+                        <p:par>
+                          <p:cTn id="4" fill="hold">
+                            <p:stCondLst>
+                              <p:cond delay="0"/>
+                            </p:stCondLst>
+                            <p:childTnLst>
+                              <p:par>
+                                <p:cTn id="5" presetID="1" presetClass="entr" presetSubtype="0" fill="hold" grpId="0" nodeType="clickEffect">
+                                  <p:stCondLst>
+                                    <p:cond delay="0"/>
+                                  </p:stCondLst>
+                                  <p:childTnLst>
+                                    <p:set>
+                                      <p:cBhvr>
+                                        <p:cTn id="6" dur="1" fill="hold">
+                                          <p:stCondLst>
+                                            <p:cond delay="0"/>
+                                          </p:stCondLst>
+                                        </p:cTn>
+                                        <p:tgtEl>
+                                          <p:spTgt spid="4">
+                                            <p:txEl>
+                                              <p:pRg st="0" end="0"/>
+                                            </p:txEl>
+                                          </p:spTgt>
+                                        </p:tgtEl>
+                                        <p:attrNameLst>
+                                          <p:attrName>style.visibility</p:attrName>
+                                        </p:attrNameLst>
+                                      </p:cBhvr>
+                                      <p:to>
+                                        <p:strVal val="visible"/>
+                                      </p:to>
+                                    </p:set>
+                                  </p:childTnLst>
+                                </p:cTn>
+                              </p:par>
+                            </p:childTnLst>
+                          </p:cTn>
+                        </p:par>
+                      </p:childTnLst>
+                    </p:cTn>
+                  </p:par>
+                  <p:par>
+                    <p:cTn id="7" fill="hold">
+                      <p:stCondLst>
+                        <p:cond delay="indefinite"/>
+                      </p:stCondLst>
+                      <p:childTnLst>
+                        <p:par>
+                          <p:cTn id="8" fill="hold">
+                            <p:stCondLst>
+                              <p:cond delay="0"/>
+                            </p:stCondLst>
+                            <p:childTnLst>
+                              <p:par>
+                                <p:cTn id="9" presetID="1" presetClass="entr" presetSubtype="0" fill="hold" grpId="0" nodeType="clickEffect">
+                                  <p:stCondLst>
+                                    <p:cond delay="0"/>
+                                  </p:stCondLst>
+                                  <p:childTnLst>
+                                    <p:set>
+                                      <p:cBhvr>
+                                        <p:cTn id="10" dur="1" fill="hold">
+                                          <p:stCondLst>
+                                            <p:cond delay="0"/>
+                                          </p:stCondLst>
+                                        </p:cTn>
+                                        <p:tgtEl>
+                                          <p:spTgt spid="4">
+                                            <p:txEl>
+                                              <p:pRg st="1" end="1"/>
+                                            </p:txEl>
+                                          </p:spTgt>
+                                        </p:tgtEl>
+                                        <p:attrNameLst>
+                                          <p:attrName>style.visibility</p:attrName>
+                                        </p:attrNameLst>
+                                      </p:cBhvr>
+                                      <p:to>
+                                        <p:strVal val="visible"/>
+                                      </p:to>
+                                    </p:set>
+                                  </p:childTnLst>
+                                </p:cTn>
+                              </p:par>
+                            </p:childTnLst>
+                          </p:cTn>
+                        </p:par>
+                      </p:childTnLst>
+                    </p:cTn>
+                  </p:par>
+                  <p:par>
+                    <p:cTn id="11" fill="hold">
+                      <p:stCondLst>
+                        <p:cond delay="indefinite"/>
+                      </p:stCondLst>
+                      <p:childTnLst>
+                        <p:par>
+                          <p:cTn id="12" fill="hold">
+                            <p:stCondLst>
+                              <p:cond delay="0"/>
+                            </p:stCondLst>
+                            <p:childTnLst>
+                              <p:par>
+                                <p:cTn id="13" presetID="1" presetClass="entr" presetSubtype="0" fill="hold" grpId="0" nodeType="clickEffect">
+                                  <p:stCondLst>
+                                    <p:cond delay="0"/>
+                                  </p:stCondLst>
+                                  <p:childTnLst>
+                                    <p:set>
+                                      <p:cBhvr>
+                                        <p:cTn id="14" dur="1" fill="hold">
+                                          <p:stCondLst>
+                                            <p:cond delay="0"/>
+                                          </p:stCondLst>
+                                        </p:cTn>
+                                        <p:tgtEl>
+                                          <p:spTgt spid="4">
+                                            <p:txEl>
+                                              <p:pRg st="2" end="2"/>
+                                            </p:txEl>
+                                          </p:spTgt>
+                                        </p:tgtEl>
+                                        <p:attrNameLst>
+                                          <p:attrName>style.visibility</p:attrName>
+                                        </p:attrNameLst>
+                                      </p:cBhvr>
+                                      <p:to>
+                                        <p:strVal val="visible"/>
+                                      </p:to>
+                                    </p:set>
+                                  </p:childTnLst>
+                                </p:cTn>
+                              </p:par>
+                            </p:childTnLst>
+                          </p:cTn>
+                        </p:par>
+                      </p:childTnLst>
+                    </p:cTn>
+                  </p:par>
+                  <p:par>
+                    <p:cTn id="15" fill="hold">
+                      <p:stCondLst>
+                        <p:cond delay="indefinite"/>
+                      </p:stCondLst>
+                      <p:childTnLst>
+                        <p:par>
+                          <p:cTn id="16" fill="hold">
+                            <p:stCondLst>
+                              <p:cond delay="0"/>
+                            </p:stCondLst>
+                            <p:childTnLst>
+                              <p:par>
+                                <p:cTn id="17" presetID="1" presetClass="entr" presetSubtype="0" fill="hold" grpId="0" nodeType="clickEffect">
+                                  <p:stCondLst>
+                                    <p:cond delay="0"/>
+                                  </p:stCondLst>
+                                  <p:childTnLst>
+                                    <p:set>
+                                      <p:cBhvr>
+                                        <p:cTn id="18" dur="1" fill="hold">
+                                          <p:stCondLst>
+                                            <p:cond delay="0"/>
+                                          </p:stCondLst>
+                                        </p:cTn>
+                                        <p:tgtEl>
+                                          <p:spTgt spid="4">
+                                            <p:txEl>
+                                              <p:pRg st="3" end="3"/>
+                                            </p:txEl>
+                                          </p:spTgt>
+                                        </p:tgtEl>
+                                        <p:attrNameLst>
+                                          <p:attrName>style.visibility</p:attrName>
+                                        </p:attrNameLst>
+                                      </p:cBhvr>
+                                      <p:to>
+                                        <p:strVal val="visible"/>
+                                      </p:to>
+                                    </p:set>
+                                  </p:childTnLst>
+                                </p:cTn>
+                              </p:par>
+                            </p:childTnLst>
+                          </p:cTn>
+                        </p:par>
+                      </p:childTnLst>
+                    </p:cTn>
+                  </p:par>
+                  <p:par>
+                    <p:cTn id="19" fill="hold">
+                      <p:stCondLst>
+                        <p:cond delay="indefinite"/>
+                      </p:stCondLst>
+                      <p:childTnLst>
+                        <p:par>
+                          <p:cTn id="20" fill="hold">
+                            <p:stCondLst>
+                              <p:cond delay="0"/>
+                            </p:stCondLst>
+                            <p:childTnLst>
+                              <p:par>
+                                <p:cTn id="21" presetID="1" presetClass="entr" presetSubtype="0" fill="hold" grpId="0" nodeType="clickEffect">
+                                  <p:stCondLst>
+                                    <p:cond delay="0"/>
+                                  </p:stCondLst>
+                                  <p:childTnLst>
+                                    <p:set>
+                                      <p:cBhvr>
+                                        <p:cTn id="22" dur="1" fill="hold">
+                                          <p:stCondLst>
+                                            <p:cond delay="0"/>
+                                          </p:stCondLst>
+                                        </p:cTn>
+                                        <p:tgtEl>
+                                          <p:spTgt spid="4">
+                                            <p:txEl>
+                                              <p:pRg st="4" end="4"/>
+                                            </p:txEl>
+                                          </p:spTgt>
+                                        </p:tgtEl>
+                                        <p:attrNameLst>
+                                          <p:attrName>style.visibility</p:attrName>
+                                        </p:attrNameLst>
+                                      </p:cBhvr>
+                                      <p:to>
+                                        <p:strVal val="visible"/>
+                                      </p:to>
+                                    </p:set>
+                                  </p:childTnLst>
+                                </p:cTn>
+                              </p:par>
+                            </p:childTnLst>
+                          </p:cTn>
+                        </p:par>
+                      </p:childTnLst>
+                    </p:cTn>
+                  </p:par>
+                  <p:par>
+                    <p:cTn id="23" fill="hold">
+                      <p:stCondLst>
+                        <p:cond delay="indefinite"/>
+                      </p:stCondLst>
+                      <p:childTnLst>
+                        <p:par>
+                          <p:cTn id="24" fill="hold">
+                            <p:stCondLst>
+                              <p:cond delay="0"/>
+                            </p:stCondLst>
+                            <p:childTnLst>
+                              <p:par>
+                                <p:cTn id="25" presetID="1" presetClass="entr" presetSubtype="0" fill="hold" grpId="0" nodeType="clickEffect">
+                                  <p:stCondLst>
+                                    <p:cond delay="0"/>
+                                  </p:stCondLst>
+                                  <p:childTnLst>
+                                    <p:set>
+                                      <p:cBhvr>
+                                        <p:cTn id="26" dur="1" fill="hold">
+                                          <p:stCondLst>
+                                            <p:cond delay="0"/>
+                                          </p:stCondLst>
+                                        </p:cTn>
+                                        <p:tgtEl>
+                                          <p:spTgt spid="4">
+                                            <p:txEl>
+                                              <p:pRg st="5" end="5"/>
+                                            </p:txEl>
+                                          </p:spTgt>
+                                        </p:tgtEl>
+                                        <p:attrNameLst>
+                                          <p:attrName>style.visibility</p:attrName>
+                                        </p:attrNameLst>
+                                      </p:cBhvr>
+                                      <p:to>
+                                        <p:strVal val="visible"/>
+                                      </p:to>
+                                    </p:set>
+                                  </p:childTnLst>
+                                </p:cTn>
+                              </p:par>
+                            </p:childTnLst>
+                          </p:cTn>
+                        </p:par>
+                      </p:childTnLst>
+                    </p:cTn>
+                  </p:par>
+                  <p:par>
+                    <p:cTn id="27" fill="hold">
+                      <p:stCondLst>
+                        <p:cond delay="indefinite"/>
+                      </p:stCondLst>
+                      <p:childTnLst>
+                        <p:par>
+                          <p:cTn id="28" fill="hold">
+                            <p:stCondLst>
+                              <p:cond delay="0"/>
+                            </p:stCondLst>
+                            <p:childTnLst>
+                              <p:par>
+                                <p:cTn id="29" presetID="1" presetClass="entr" presetSubtype="0" fill="hold" grpId="0" nodeType="clickEffect">
+                                  <p:stCondLst>
+                                    <p:cond delay="0"/>
+                                  </p:stCondLst>
+                                  <p:childTnLst>
+                                    <p:set>
+                                      <p:cBhvr>
+                                        <p:cTn id="30" dur="1" fill="hold">
+                                          <p:stCondLst>
+                                            <p:cond delay="0"/>
+                                          </p:stCondLst>
+                                        </p:cTn>
+                                        <p:tgtEl>
+                                          <p:spTgt spid="4">
+                                            <p:txEl>
+                                              <p:pRg st="6" end="6"/>
+                                            </p:txEl>
+                                          </p:spTgt>
+                                        </p:tgtEl>
+                                        <p:attrNameLst>
+                                          <p:attrName>style.visibility</p:attrName>
+                                        </p:attrNameLst>
+                                      </p:cBhvr>
+                                      <p:to>
+                                        <p:strVal val="visible"/>
+                                      </p:to>
+                                    </p:set>
+                                  </p:childTnLst>
+                                </p:cTn>
+                              </p:par>
+                            </p:childTnLst>
+                          </p:cTn>
+                        </p:par>
+                      </p:childTnLst>
+                    </p:cTn>
+                  </p:par>
+                  <p:par>
+                    <p:cTn id="31" fill="hold">
+                      <p:stCondLst>
+                        <p:cond delay="indefinite"/>
+                      </p:stCondLst>
+                      <p:childTnLst>
+                        <p:par>
+                          <p:cTn id="32" fill="hold">
+                            <p:stCondLst>
+                              <p:cond delay="0"/>
+                            </p:stCondLst>
+                            <p:childTnLst>
+                              <p:par>
+                                <p:cTn id="33" presetID="1" presetClass="entr" presetSubtype="0" fill="hold" grpId="0" nodeType="clickEffect">
+                                  <p:stCondLst>
+                                    <p:cond delay="0"/>
+                                  </p:stCondLst>
+                                  <p:childTnLst>
+                                    <p:set>
+                                      <p:cBhvr>
+                                        <p:cTn id="34" dur="1" fill="hold">
+                                          <p:stCondLst>
+                                            <p:cond delay="0"/>
+                                          </p:stCondLst>
+                                        </p:cTn>
+                                        <p:tgtEl>
+                                          <p:spTgt spid="4">
+                                            <p:txEl>
+                                              <p:pRg st="7" end="7"/>
+                                            </p:txEl>
+                                          </p:spTgt>
+                                        </p:tgtEl>
+                                        <p:attrNameLst>
+                                          <p:attrName>style.visibility</p:attrName>
+                                        </p:attrNameLst>
+                                      </p:cBhvr>
+                                      <p:to>
+                                        <p:strVal val="visible"/>
+                                      </p:to>
+                                    </p:set>
+                                  </p:childTnLst>
+                                </p:cTn>
+                              </p:par>
+                            </p:childTnLst>
+                          </p:cTn>
+                        </p:par>
+                      </p:childTnLst>
+                    </p:cTn>
+                  </p:par>
+                </p:childTnLst>
+              </p:cTn>
+              <p:prevCondLst>
+                <p:cond evt="onPrev" delay="0">
+                  <p:tgtEl>
+                    <p:sldTgt/>
+                  </p:tgtEl>
+                </p:cond>
+              </p:prevCondLst>
+              <p:nextCondLst>
+                <p:cond evt="onNext" delay="0">
+                  <p:tgtEl>
+                    <p:sldTgt/>
+                  </p:tgtEl>
+                </p:cond>
+              </p:nextCondLst>
+            </p:seq>
+          </p:childTnLst>
+        </p:cTn>
+      </p:par>
+    </p:tnLst>
+    <p:bldLst>
+      <p:bldP spid="4" grpId="0" build="p"/>
+    </p:bldLst>
+  </p:timing>
+</p:sld>
+</file>
+
+<file path=ppt/slides/slide13.xml><?xml version="1.0" encoding="utf-8"?>
+<p:sld xmlns:a="http://schemas.openxmlformats.org/drawingml/2006/main" xmlns:r="http://schemas.openxmlformats.org/officeDocument/2006/relationships" xmlns:p="http://schemas.openxmlformats.org/presentationml/2006/main">
+  <p:cSld>
+    <p:spTree>
+      <p:nvGrpSpPr>
+        <p:cNvPr id="1" name=""/>
+        <p:cNvGrpSpPr/>
+        <p:nvPr/>
+      </p:nvGrpSpPr>
+      <p:grpSpPr>
+        <a:xfrm>
+          <a:off x="0" y="0"/>
+          <a:ext cx="0" cy="0"/>
+          <a:chOff x="0" y="0"/>
+          <a:chExt cx="0" cy="0"/>
+        </a:xfrm>
+      </p:grpSpPr>
+      <p:sp>
+        <p:nvSpPr>
+          <p:cNvPr id="2" name="Title 1"/>
+          <p:cNvSpPr>
+            <a:spLocks noGrp="1"/>
+          </p:cNvSpPr>
+          <p:nvPr>
+            <p:ph type="title"/>
+          </p:nvPr>
+        </p:nvSpPr>
+        <p:spPr>
+          <a:xfrm>
+            <a:off x="533400" y="152400"/>
+            <a:ext cx="10972800" cy="563562"/>
+          </a:xfrm>
+        </p:spPr>
+        <p:txBody>
+          <a:bodyPr>
+            <a:normAutofit fontScale="90000"/>
+          </a:bodyPr>
+          <a:lstStyle/>
+          <a:p>
+            <a:pPr algn="l"/>
+            <a:r>
+              <a:rPr lang="en-US" dirty="0" smtClean="0"/>
+              <a:t>Steve Rozen</a:t>
+            </a:r>
+            <a:endParaRPr lang="en-US" dirty="0"/>
+          </a:p>
+        </p:txBody>
+      </p:sp>
+      <p:sp>
+        <p:nvSpPr>
+          <p:cNvPr id="4" name="Content Placeholder 3"/>
+          <p:cNvSpPr>
+            <a:spLocks noGrp="1"/>
+          </p:cNvSpPr>
+          <p:nvPr>
+            <p:ph idx="1"/>
+          </p:nvPr>
+        </p:nvSpPr>
+        <p:spPr>
+          <a:xfrm>
+            <a:off x="609600" y="914400"/>
+            <a:ext cx="10134600" cy="5715000"/>
+          </a:xfrm>
+        </p:spPr>
+        <p:txBody>
+          <a:bodyPr>
+            <a:normAutofit lnSpcReduction="10000"/>
+          </a:bodyPr>
+          <a:lstStyle/>
+          <a:p>
+            <a:r>
+              <a:rPr lang="en-US" sz="2800" dirty="0" smtClean="0"/>
+              <a:t>Went </a:t>
+            </a:r>
+            <a:r>
+              <a:rPr lang="en-US" sz="2800" dirty="0" smtClean="0"/>
+              <a:t>to the lab of David Page and did a mix of lab work and bioinformatics for 8 years</a:t>
+            </a:r>
+          </a:p>
+          <a:p>
+            <a:r>
+              <a:rPr lang="en-US" sz="2800" dirty="0" smtClean="0"/>
+              <a:t>Some very high profile genetics publications (Nature, Nature Genetics)</a:t>
+            </a:r>
+          </a:p>
+          <a:p>
+            <a:r>
+              <a:rPr lang="en-US" sz="2800" dirty="0" smtClean="0"/>
+              <a:t>Went to Duke-NUS in 2008, found great collaborators in cancer genomics (Patrick Tan, Bin Teh)</a:t>
+            </a:r>
+          </a:p>
+          <a:p>
+            <a:r>
+              <a:rPr lang="en-US" sz="2800" dirty="0" smtClean="0"/>
+              <a:t>Caught the cancer-resequencing wave: high </a:t>
+            </a:r>
+            <a:r>
+              <a:rPr lang="en-US" sz="2800" dirty="0" smtClean="0"/>
+              <a:t>impact papers </a:t>
+            </a:r>
+            <a:r>
+              <a:rPr lang="en-US" sz="2800" dirty="0" smtClean="0"/>
+              <a:t> on aristolochic acid, </a:t>
+            </a:r>
+            <a:r>
+              <a:rPr lang="en-US" sz="2800" dirty="0" smtClean="0"/>
+              <a:t>gastric cancer, bile duct cancer, </a:t>
+            </a:r>
+            <a:r>
+              <a:rPr lang="en-US" sz="2800" dirty="0" smtClean="0"/>
+              <a:t>…</a:t>
+            </a:r>
+          </a:p>
+          <a:p>
+            <a:r>
+              <a:rPr lang="en-US" dirty="0" smtClean="0"/>
+              <a:t>Last several years heavily involved in mutational signatures, both from data mining and experimental elucidation</a:t>
+            </a:r>
+          </a:p>
+          <a:p>
+            <a:r>
+              <a:rPr lang="en-US" dirty="0" smtClean="0"/>
+              <a:t>Mutational signatures also showed widespread exposure to the carcinogen and nephrotoxin aristolochic acid in multiple cancer types; trying to raise awareness, get more funding, and get more researchers working on this</a:t>
+            </a:r>
+            <a:endParaRPr lang="en-US" sz="2800" dirty="0" smtClean="0"/>
+          </a:p>
+          <a:p>
+            <a:endParaRPr lang="en-US" sz="2800" dirty="0" smtClean="0"/>
+          </a:p>
+          <a:p>
+            <a:endParaRPr lang="en-US" sz="2800" dirty="0"/>
+          </a:p>
+        </p:txBody>
+      </p:sp>
+      <p:sp>
+        <p:nvSpPr>
+          <p:cNvPr id="3" name="Slide Number Placeholder 2"/>
+          <p:cNvSpPr>
+            <a:spLocks noGrp="1"/>
+          </p:cNvSpPr>
+          <p:nvPr>
+            <p:ph type="sldNum" sz="quarter" idx="12"/>
+          </p:nvPr>
+        </p:nvSpPr>
+        <p:spPr/>
+        <p:txBody>
+          <a:bodyPr/>
+          <a:lstStyle/>
+          <a:p>
+            <a:pPr>
+              <a:defRPr/>
+            </a:pPr>
+            <a:fld id="{47EB465D-2B07-4782-9D38-CDF7B0E66DA7}" type="slidenum">
+              <a:rPr lang="en-US" smtClean="0"/>
+              <a:pPr>
+                <a:defRPr/>
+              </a:pPr>
+              <a:t>13</a:t>
+            </a:fld>
+            <a:endParaRPr lang="en-US"/>
+          </a:p>
+        </p:txBody>
+      </p:sp>
+    </p:spTree>
+    <p:extLst>
+      <p:ext uri="{BB962C8B-B14F-4D97-AF65-F5344CB8AC3E}">
+        <p14:creationId xmlns:p14="http://schemas.microsoft.com/office/powerpoint/2010/main" val="2765839871"/>
+      </p:ext>
+    </p:extLst>
+  </p:cSld>
+  <p:clrMapOvr>
+    <a:masterClrMapping/>
+  </p:clrMapOvr>
+  <p:timing>
+    <p:tnLst>
+      <p:par>
+        <p:cTn id="1" dur="indefinite" restart="never" nodeType="tmRoot">
+          <p:childTnLst>
+            <p:seq concurrent="1" nextAc="seek">
+              <p:cTn id="2" dur="indefinite" nodeType="mainSeq">
+                <p:childTnLst>
+                  <p:par>
+                    <p:cTn id="3" fill="hold">
+                      <p:stCondLst>
+                        <p:cond delay="indefinite"/>
+                      </p:stCondLst>
+                      <p:childTnLst>
+                        <p:par>
+                          <p:cTn id="4" fill="hold">
+                            <p:stCondLst>
+                              <p:cond delay="0"/>
+                            </p:stCondLst>
+                            <p:childTnLst>
+                              <p:par>
+                                <p:cTn id="5" presetID="1" presetClass="entr" presetSubtype="0" fill="hold" grpId="0" nodeType="clickEffect">
+                                  <p:stCondLst>
+                                    <p:cond delay="0"/>
+                                  </p:stCondLst>
+                                  <p:childTnLst>
+                                    <p:set>
+                                      <p:cBhvr>
+                                        <p:cTn id="6" dur="1" fill="hold">
+                                          <p:stCondLst>
+                                            <p:cond delay="0"/>
+                                          </p:stCondLst>
+                                        </p:cTn>
+                                        <p:tgtEl>
+                                          <p:spTgt spid="4">
+                                            <p:txEl>
+                                              <p:pRg st="0" end="0"/>
+                                            </p:txEl>
+                                          </p:spTgt>
+                                        </p:tgtEl>
+                                        <p:attrNameLst>
+                                          <p:attrName>style.visibility</p:attrName>
+                                        </p:attrNameLst>
+                                      </p:cBhvr>
+                                      <p:to>
+                                        <p:strVal val="visible"/>
+                                      </p:to>
+                                    </p:set>
+                                  </p:childTnLst>
+                                </p:cTn>
+                              </p:par>
+                            </p:childTnLst>
+                          </p:cTn>
+                        </p:par>
+                      </p:childTnLst>
+                    </p:cTn>
+                  </p:par>
+                  <p:par>
+                    <p:cTn id="7" fill="hold">
+                      <p:stCondLst>
+                        <p:cond delay="indefinite"/>
+                      </p:stCondLst>
+                      <p:childTnLst>
+                        <p:par>
+                          <p:cTn id="8" fill="hold">
+                            <p:stCondLst>
+                              <p:cond delay="0"/>
+                            </p:stCondLst>
+                            <p:childTnLst>
+                              <p:par>
+                                <p:cTn id="9" presetID="1" presetClass="entr" presetSubtype="0" fill="hold" grpId="0" nodeType="clickEffect">
+                                  <p:stCondLst>
+                                    <p:cond delay="0"/>
+                                  </p:stCondLst>
+                                  <p:childTnLst>
+                                    <p:set>
+                                      <p:cBhvr>
+                                        <p:cTn id="10" dur="1" fill="hold">
+                                          <p:stCondLst>
+                                            <p:cond delay="0"/>
+                                          </p:stCondLst>
+                                        </p:cTn>
+                                        <p:tgtEl>
+                                          <p:spTgt spid="4">
+                                            <p:txEl>
+                                              <p:pRg st="1" end="1"/>
+                                            </p:txEl>
+                                          </p:spTgt>
+                                        </p:tgtEl>
+                                        <p:attrNameLst>
+                                          <p:attrName>style.visibility</p:attrName>
+                                        </p:attrNameLst>
+                                      </p:cBhvr>
+                                      <p:to>
+                                        <p:strVal val="visible"/>
+                                      </p:to>
+                                    </p:set>
+                                  </p:childTnLst>
+                                </p:cTn>
+                              </p:par>
+                            </p:childTnLst>
+                          </p:cTn>
+                        </p:par>
+                      </p:childTnLst>
+                    </p:cTn>
+                  </p:par>
+                  <p:par>
+                    <p:cTn id="11" fill="hold">
+                      <p:stCondLst>
+                        <p:cond delay="indefinite"/>
+                      </p:stCondLst>
+                      <p:childTnLst>
+                        <p:par>
+                          <p:cTn id="12" fill="hold">
+                            <p:stCondLst>
+                              <p:cond delay="0"/>
+                            </p:stCondLst>
+                            <p:childTnLst>
+                              <p:par>
+                                <p:cTn id="13" presetID="1" presetClass="entr" presetSubtype="0" fill="hold" grpId="0" nodeType="clickEffect">
+                                  <p:stCondLst>
+                                    <p:cond delay="0"/>
+                                  </p:stCondLst>
+                                  <p:childTnLst>
+                                    <p:set>
+                                      <p:cBhvr>
+                                        <p:cTn id="14" dur="1" fill="hold">
+                                          <p:stCondLst>
+                                            <p:cond delay="0"/>
+                                          </p:stCondLst>
+                                        </p:cTn>
+                                        <p:tgtEl>
+                                          <p:spTgt spid="4">
+                                            <p:txEl>
+                                              <p:pRg st="2" end="2"/>
+                                            </p:txEl>
+                                          </p:spTgt>
+                                        </p:tgtEl>
+                                        <p:attrNameLst>
+                                          <p:attrName>style.visibility</p:attrName>
+                                        </p:attrNameLst>
+                                      </p:cBhvr>
+                                      <p:to>
+                                        <p:strVal val="visible"/>
+                                      </p:to>
+                                    </p:set>
+                                  </p:childTnLst>
+                                </p:cTn>
+                              </p:par>
+                            </p:childTnLst>
+                          </p:cTn>
+                        </p:par>
+                      </p:childTnLst>
+                    </p:cTn>
+                  </p:par>
+                  <p:par>
+                    <p:cTn id="15" fill="hold">
+                      <p:stCondLst>
+                        <p:cond delay="indefinite"/>
+                      </p:stCondLst>
+                      <p:childTnLst>
+                        <p:par>
+                          <p:cTn id="16" fill="hold">
+                            <p:stCondLst>
+                              <p:cond delay="0"/>
+                            </p:stCondLst>
+                            <p:childTnLst>
+                              <p:par>
+                                <p:cTn id="17" presetID="1" presetClass="entr" presetSubtype="0" fill="hold" grpId="0" nodeType="clickEffect">
+                                  <p:stCondLst>
+                                    <p:cond delay="0"/>
+                                  </p:stCondLst>
+                                  <p:childTnLst>
+                                    <p:set>
+                                      <p:cBhvr>
+                                        <p:cTn id="18" dur="1" fill="hold">
+                                          <p:stCondLst>
+                                            <p:cond delay="0"/>
+                                          </p:stCondLst>
+                                        </p:cTn>
+                                        <p:tgtEl>
+                                          <p:spTgt spid="4">
+                                            <p:txEl>
+                                              <p:pRg st="3" end="3"/>
+                                            </p:txEl>
+                                          </p:spTgt>
+                                        </p:tgtEl>
+                                        <p:attrNameLst>
+                                          <p:attrName>style.visibility</p:attrName>
+                                        </p:attrNameLst>
+                                      </p:cBhvr>
+                                      <p:to>
+                                        <p:strVal val="visible"/>
+                                      </p:to>
+                                    </p:set>
+                                  </p:childTnLst>
+                                </p:cTn>
+                              </p:par>
+                            </p:childTnLst>
+                          </p:cTn>
+                        </p:par>
+                      </p:childTnLst>
+                    </p:cTn>
+                  </p:par>
+                  <p:par>
+                    <p:cTn id="19" fill="hold">
+                      <p:stCondLst>
+                        <p:cond delay="indefinite"/>
+                      </p:stCondLst>
+                      <p:childTnLst>
+                        <p:par>
+                          <p:cTn id="20" fill="hold">
+                            <p:stCondLst>
+                              <p:cond delay="0"/>
+                            </p:stCondLst>
+                            <p:childTnLst>
+                              <p:par>
+                                <p:cTn id="21" presetID="1" presetClass="entr" presetSubtype="0" fill="hold" grpId="0" nodeType="clickEffect">
+                                  <p:stCondLst>
+                                    <p:cond delay="0"/>
+                                  </p:stCondLst>
+                                  <p:childTnLst>
+                                    <p:set>
+                                      <p:cBhvr>
+                                        <p:cTn id="22" dur="1" fill="hold">
+                                          <p:stCondLst>
+                                            <p:cond delay="0"/>
+                                          </p:stCondLst>
+                                        </p:cTn>
+                                        <p:tgtEl>
+                                          <p:spTgt spid="4">
+                                            <p:txEl>
+                                              <p:pRg st="4" end="4"/>
+                                            </p:txEl>
+                                          </p:spTgt>
+                                        </p:tgtEl>
+                                        <p:attrNameLst>
+                                          <p:attrName>style.visibility</p:attrName>
+                                        </p:attrNameLst>
+                                      </p:cBhvr>
+                                      <p:to>
+                                        <p:strVal val="visible"/>
+                                      </p:to>
+                                    </p:set>
+                                  </p:childTnLst>
+                                </p:cTn>
+                              </p:par>
+                            </p:childTnLst>
+                          </p:cTn>
+                        </p:par>
+                      </p:childTnLst>
+                    </p:cTn>
+                  </p:par>
+                  <p:par>
+                    <p:cTn id="23" fill="hold">
+                      <p:stCondLst>
+                        <p:cond delay="indefinite"/>
+                      </p:stCondLst>
+                      <p:childTnLst>
+                        <p:par>
+                          <p:cTn id="24" fill="hold">
+                            <p:stCondLst>
+                              <p:cond delay="0"/>
+                            </p:stCondLst>
+                            <p:childTnLst>
+                              <p:par>
+                                <p:cTn id="25" presetID="1" presetClass="entr" presetSubtype="0" fill="hold" grpId="0" nodeType="clickEffect">
+                                  <p:stCondLst>
+                                    <p:cond delay="0"/>
+                                  </p:stCondLst>
+                                  <p:childTnLst>
+                                    <p:set>
+                                      <p:cBhvr>
+                                        <p:cTn id="26" dur="1" fill="hold">
+                                          <p:stCondLst>
+                                            <p:cond delay="0"/>
+                                          </p:stCondLst>
+                                        </p:cTn>
+                                        <p:tgtEl>
+                                          <p:spTgt spid="4">
+                                            <p:txEl>
+                                              <p:pRg st="5" end="5"/>
+                                            </p:txEl>
+                                          </p:spTgt>
+                                        </p:tgtEl>
+                                        <p:attrNameLst>
+                                          <p:attrName>style.visibility</p:attrName>
+                                        </p:attrNameLst>
+                                      </p:cBhvr>
+                                      <p:to>
+                                        <p:strVal val="visible"/>
+                                      </p:to>
+                                    </p:set>
+                                  </p:childTnLst>
+                                </p:cTn>
+                              </p:par>
+                            </p:childTnLst>
+                          </p:cTn>
+                        </p:par>
+                      </p:childTnLst>
+                    </p:cTn>
+                  </p:par>
+                </p:childTnLst>
+              </p:cTn>
+              <p:prevCondLst>
+                <p:cond evt="onPrev" delay="0">
+                  <p:tgtEl>
+                    <p:sldTgt/>
+                  </p:tgtEl>
+                </p:cond>
+              </p:prevCondLst>
+              <p:nextCondLst>
+                <p:cond evt="onNext" delay="0">
+                  <p:tgtEl>
+                    <p:sldTgt/>
+                  </p:tgtEl>
+                </p:cond>
+              </p:nextCondLst>
+            </p:seq>
+          </p:childTnLst>
+        </p:cTn>
+      </p:par>
+    </p:tnLst>
+    <p:bldLst>
+      <p:bldP spid="4" grpId="0" build="p"/>
+    </p:bldLst>
   </p:timing>
 </p:sld>
 </file>
@@ -7874,6 +10376,1686 @@
         <p:cTn id="1" dur="indefinite" restart="never" nodeType="tmRoot"/>
       </p:par>
     </p:tnLst>
+  </p:timing>
+</p:sld>
+</file>
+
+<file path=ppt/slides/slide7.xml><?xml version="1.0" encoding="utf-8"?>
+<p:sld xmlns:a="http://schemas.openxmlformats.org/drawingml/2006/main" xmlns:r="http://schemas.openxmlformats.org/officeDocument/2006/relationships" xmlns:p="http://schemas.openxmlformats.org/presentationml/2006/main">
+  <p:cSld>
+    <p:spTree>
+      <p:nvGrpSpPr>
+        <p:cNvPr id="1" name=""/>
+        <p:cNvGrpSpPr/>
+        <p:nvPr/>
+      </p:nvGrpSpPr>
+      <p:grpSpPr>
+        <a:xfrm>
+          <a:off x="0" y="0"/>
+          <a:ext cx="0" cy="0"/>
+          <a:chOff x="0" y="0"/>
+          <a:chExt cx="0" cy="0"/>
+        </a:xfrm>
+      </p:grpSpPr>
+      <p:sp>
+        <p:nvSpPr>
+          <p:cNvPr id="3" name="Subtitle 5"/>
+          <p:cNvSpPr txBox="1">
+            <a:spLocks/>
+          </p:cNvSpPr>
+          <p:nvPr/>
+        </p:nvSpPr>
+        <p:spPr>
+          <a:xfrm>
+            <a:off x="711200" y="333274"/>
+            <a:ext cx="11017956" cy="6276370"/>
+          </a:xfrm>
+          <a:prstGeom prst="rect">
+            <a:avLst/>
+          </a:prstGeom>
+        </p:spPr>
+        <p:txBody>
+          <a:bodyPr vert="horz" lIns="91440" tIns="45720" rIns="91440" bIns="45720" rtlCol="0">
+            <a:normAutofit/>
+          </a:bodyPr>
+          <a:lstStyle>
+            <a:lvl1pPr marL="0" indent="0" algn="ctr" defTabSz="914400" rtl="0" eaLnBrk="1" latinLnBrk="0" hangingPunct="1">
+              <a:lnSpc>
+                <a:spcPct val="90000"/>
+              </a:lnSpc>
+              <a:spcBef>
+                <a:spcPts val="1000"/>
+              </a:spcBef>
+              <a:buFont typeface="Arial" panose="020B0604020202020204" pitchFamily="34" charset="0"/>
+              <a:buNone/>
+              <a:defRPr sz="2400" kern="1200">
+                <a:solidFill>
+                  <a:schemeClr val="tx1"/>
+                </a:solidFill>
+                <a:latin typeface="+mn-lt"/>
+                <a:ea typeface="+mn-ea"/>
+                <a:cs typeface="+mn-cs"/>
+              </a:defRPr>
+            </a:lvl1pPr>
+            <a:lvl2pPr marL="457200" indent="0" algn="ctr" defTabSz="914400" rtl="0" eaLnBrk="1" latinLnBrk="0" hangingPunct="1">
+              <a:lnSpc>
+                <a:spcPct val="90000"/>
+              </a:lnSpc>
+              <a:spcBef>
+                <a:spcPts val="500"/>
+              </a:spcBef>
+              <a:buFont typeface="Arial" panose="020B0604020202020204" pitchFamily="34" charset="0"/>
+              <a:buNone/>
+              <a:defRPr sz="2000" kern="1200">
+                <a:solidFill>
+                  <a:schemeClr val="tx1"/>
+                </a:solidFill>
+                <a:latin typeface="+mn-lt"/>
+                <a:ea typeface="+mn-ea"/>
+                <a:cs typeface="+mn-cs"/>
+              </a:defRPr>
+            </a:lvl2pPr>
+            <a:lvl3pPr marL="914400" indent="0" algn="ctr" defTabSz="914400" rtl="0" eaLnBrk="1" latinLnBrk="0" hangingPunct="1">
+              <a:lnSpc>
+                <a:spcPct val="90000"/>
+              </a:lnSpc>
+              <a:spcBef>
+                <a:spcPts val="500"/>
+              </a:spcBef>
+              <a:buFont typeface="Arial" panose="020B0604020202020204" pitchFamily="34" charset="0"/>
+              <a:buNone/>
+              <a:defRPr sz="1800" kern="1200">
+                <a:solidFill>
+                  <a:schemeClr val="tx1"/>
+                </a:solidFill>
+                <a:latin typeface="+mn-lt"/>
+                <a:ea typeface="+mn-ea"/>
+                <a:cs typeface="+mn-cs"/>
+              </a:defRPr>
+            </a:lvl3pPr>
+            <a:lvl4pPr marL="1371600" indent="0" algn="ctr" defTabSz="914400" rtl="0" eaLnBrk="1" latinLnBrk="0" hangingPunct="1">
+              <a:lnSpc>
+                <a:spcPct val="90000"/>
+              </a:lnSpc>
+              <a:spcBef>
+                <a:spcPts val="500"/>
+              </a:spcBef>
+              <a:buFont typeface="Arial" panose="020B0604020202020204" pitchFamily="34" charset="0"/>
+              <a:buNone/>
+              <a:defRPr sz="1600" kern="1200">
+                <a:solidFill>
+                  <a:schemeClr val="tx1"/>
+                </a:solidFill>
+                <a:latin typeface="+mn-lt"/>
+                <a:ea typeface="+mn-ea"/>
+                <a:cs typeface="+mn-cs"/>
+              </a:defRPr>
+            </a:lvl4pPr>
+            <a:lvl5pPr marL="1828800" indent="0" algn="ctr" defTabSz="914400" rtl="0" eaLnBrk="1" latinLnBrk="0" hangingPunct="1">
+              <a:lnSpc>
+                <a:spcPct val="90000"/>
+              </a:lnSpc>
+              <a:spcBef>
+                <a:spcPts val="500"/>
+              </a:spcBef>
+              <a:buFont typeface="Arial" panose="020B0604020202020204" pitchFamily="34" charset="0"/>
+              <a:buNone/>
+              <a:defRPr sz="1600" kern="1200">
+                <a:solidFill>
+                  <a:schemeClr val="tx1"/>
+                </a:solidFill>
+                <a:latin typeface="+mn-lt"/>
+                <a:ea typeface="+mn-ea"/>
+                <a:cs typeface="+mn-cs"/>
+              </a:defRPr>
+            </a:lvl5pPr>
+            <a:lvl6pPr marL="2286000" indent="0" algn="ctr" defTabSz="914400" rtl="0" eaLnBrk="1" latinLnBrk="0" hangingPunct="1">
+              <a:lnSpc>
+                <a:spcPct val="90000"/>
+              </a:lnSpc>
+              <a:spcBef>
+                <a:spcPts val="500"/>
+              </a:spcBef>
+              <a:buFont typeface="Arial" panose="020B0604020202020204" pitchFamily="34" charset="0"/>
+              <a:buNone/>
+              <a:defRPr sz="1600" kern="1200">
+                <a:solidFill>
+                  <a:schemeClr val="tx1"/>
+                </a:solidFill>
+                <a:latin typeface="+mn-lt"/>
+                <a:ea typeface="+mn-ea"/>
+                <a:cs typeface="+mn-cs"/>
+              </a:defRPr>
+            </a:lvl6pPr>
+            <a:lvl7pPr marL="2743200" indent="0" algn="ctr" defTabSz="914400" rtl="0" eaLnBrk="1" latinLnBrk="0" hangingPunct="1">
+              <a:lnSpc>
+                <a:spcPct val="90000"/>
+              </a:lnSpc>
+              <a:spcBef>
+                <a:spcPts val="500"/>
+              </a:spcBef>
+              <a:buFont typeface="Arial" panose="020B0604020202020204" pitchFamily="34" charset="0"/>
+              <a:buNone/>
+              <a:defRPr sz="1600" kern="1200">
+                <a:solidFill>
+                  <a:schemeClr val="tx1"/>
+                </a:solidFill>
+                <a:latin typeface="+mn-lt"/>
+                <a:ea typeface="+mn-ea"/>
+                <a:cs typeface="+mn-cs"/>
+              </a:defRPr>
+            </a:lvl7pPr>
+            <a:lvl8pPr marL="3200400" indent="0" algn="ctr" defTabSz="914400" rtl="0" eaLnBrk="1" latinLnBrk="0" hangingPunct="1">
+              <a:lnSpc>
+                <a:spcPct val="90000"/>
+              </a:lnSpc>
+              <a:spcBef>
+                <a:spcPts val="500"/>
+              </a:spcBef>
+              <a:buFont typeface="Arial" panose="020B0604020202020204" pitchFamily="34" charset="0"/>
+              <a:buNone/>
+              <a:defRPr sz="1600" kern="1200">
+                <a:solidFill>
+                  <a:schemeClr val="tx1"/>
+                </a:solidFill>
+                <a:latin typeface="+mn-lt"/>
+                <a:ea typeface="+mn-ea"/>
+                <a:cs typeface="+mn-cs"/>
+              </a:defRPr>
+            </a:lvl8pPr>
+            <a:lvl9pPr marL="3657600" indent="0" algn="ctr" defTabSz="914400" rtl="0" eaLnBrk="1" latinLnBrk="0" hangingPunct="1">
+              <a:lnSpc>
+                <a:spcPct val="90000"/>
+              </a:lnSpc>
+              <a:spcBef>
+                <a:spcPts val="500"/>
+              </a:spcBef>
+              <a:buFont typeface="Arial" panose="020B0604020202020204" pitchFamily="34" charset="0"/>
+              <a:buNone/>
+              <a:defRPr sz="1600" kern="1200">
+                <a:solidFill>
+                  <a:schemeClr val="tx1"/>
+                </a:solidFill>
+                <a:latin typeface="+mn-lt"/>
+                <a:ea typeface="+mn-ea"/>
+                <a:cs typeface="+mn-cs"/>
+              </a:defRPr>
+            </a:lvl9pPr>
+          </a:lstStyle>
+          <a:p>
+            <a:pPr algn="l">
+              <a:lnSpc>
+                <a:spcPct val="100000"/>
+              </a:lnSpc>
+              <a:spcBef>
+                <a:spcPts val="0"/>
+              </a:spcBef>
+              <a:defRPr/>
+            </a:pPr>
+            <a:r>
+              <a:rPr lang="en-US" sz="4400" dirty="0" smtClean="0"/>
+              <a:t>Arnoud Boot</a:t>
+            </a:r>
+          </a:p>
+          <a:p>
+            <a:pPr algn="l">
+              <a:lnSpc>
+                <a:spcPct val="100000"/>
+              </a:lnSpc>
+              <a:spcBef>
+                <a:spcPts val="0"/>
+              </a:spcBef>
+              <a:defRPr/>
+            </a:pPr>
+            <a:endParaRPr lang="en-US" sz="4400" dirty="0"/>
+          </a:p>
+          <a:p>
+            <a:pPr algn="l">
+              <a:lnSpc>
+                <a:spcPct val="100000"/>
+              </a:lnSpc>
+              <a:spcBef>
+                <a:spcPts val="0"/>
+              </a:spcBef>
+              <a:defRPr/>
+            </a:pPr>
+            <a:endParaRPr lang="en-US" sz="4400" dirty="0" smtClean="0"/>
+          </a:p>
+          <a:p>
+            <a:pPr algn="l">
+              <a:lnSpc>
+                <a:spcPct val="100000"/>
+              </a:lnSpc>
+              <a:spcBef>
+                <a:spcPts val="0"/>
+              </a:spcBef>
+              <a:defRPr/>
+            </a:pPr>
+            <a:endParaRPr lang="en-US" sz="4400" dirty="0"/>
+          </a:p>
+          <a:p>
+            <a:pPr algn="l">
+              <a:lnSpc>
+                <a:spcPct val="100000"/>
+              </a:lnSpc>
+              <a:spcBef>
+                <a:spcPts val="0"/>
+              </a:spcBef>
+              <a:defRPr/>
+            </a:pPr>
+            <a:endParaRPr lang="en-US" sz="4400" dirty="0" smtClean="0"/>
+          </a:p>
+          <a:p>
+            <a:pPr algn="l">
+              <a:lnSpc>
+                <a:spcPct val="100000"/>
+              </a:lnSpc>
+              <a:spcBef>
+                <a:spcPts val="0"/>
+              </a:spcBef>
+              <a:defRPr/>
+            </a:pPr>
+            <a:endParaRPr lang="en-US" sz="4400" dirty="0"/>
+          </a:p>
+          <a:p>
+            <a:pPr algn="l">
+              <a:lnSpc>
+                <a:spcPct val="100000"/>
+              </a:lnSpc>
+              <a:spcBef>
+                <a:spcPts val="0"/>
+              </a:spcBef>
+              <a:defRPr/>
+            </a:pPr>
+            <a:endParaRPr lang="en-US" sz="4400" dirty="0" smtClean="0"/>
+          </a:p>
+          <a:p>
+            <a:pPr algn="l">
+              <a:lnSpc>
+                <a:spcPct val="100000"/>
+              </a:lnSpc>
+              <a:spcBef>
+                <a:spcPts val="0"/>
+              </a:spcBef>
+              <a:defRPr/>
+            </a:pPr>
+            <a:endParaRPr lang="en-US" sz="2000" dirty="0" smtClean="0"/>
+          </a:p>
+          <a:p>
+            <a:pPr algn="l">
+              <a:lnSpc>
+                <a:spcPct val="100000"/>
+              </a:lnSpc>
+              <a:spcBef>
+                <a:spcPts val="0"/>
+              </a:spcBef>
+              <a:defRPr/>
+            </a:pPr>
+            <a:r>
+              <a:rPr lang="en-US" sz="2000" dirty="0" smtClean="0"/>
+              <a:t>PhD in molecular biology: Genomic instability of thyroid and colorectal cancer.</a:t>
+            </a:r>
+          </a:p>
+          <a:p>
+            <a:pPr algn="l"/>
+            <a:endParaRPr lang="en-US" sz="4400" dirty="0"/>
+          </a:p>
+        </p:txBody>
+      </p:sp>
+      <p:pic>
+        <p:nvPicPr>
+          <p:cNvPr id="4" name="Picture 14" descr="https://www.duke-nus.edu.sg/images/librariesprovider6/pem-staff-library/arnoud-boot1.jpg?Status=Master&amp;sfvrsn=c04fc007_0"/>
+          <p:cNvPicPr>
+            <a:picLocks noChangeAspect="1" noChangeArrowheads="1"/>
+          </p:cNvPicPr>
+          <p:nvPr/>
+        </p:nvPicPr>
+        <p:blipFill>
+          <a:blip r:embed="rId2">
+            <a:extLst>
+              <a:ext uri="{28A0092B-C50C-407E-A947-70E740481C1C}">
+                <a14:useLocalDpi xmlns:a14="http://schemas.microsoft.com/office/drawing/2010/main" val="0"/>
+              </a:ext>
+            </a:extLst>
+          </a:blip>
+          <a:srcRect/>
+          <a:stretch>
+            <a:fillRect/>
+          </a:stretch>
+        </p:blipFill>
+        <p:spPr bwMode="auto">
+          <a:xfrm>
+            <a:off x="1145771" y="1265804"/>
+            <a:ext cx="2105428" cy="2947599"/>
+          </a:xfrm>
+          <a:prstGeom prst="rect">
+            <a:avLst/>
+          </a:prstGeom>
+          <a:noFill/>
+          <a:extLst>
+            <a:ext uri="{909E8E84-426E-40DD-AFC4-6F175D3DCCD1}">
+              <a14:hiddenFill xmlns:a14="http://schemas.microsoft.com/office/drawing/2010/main">
+                <a:solidFill>
+                  <a:srgbClr val="FFFFFF"/>
+                </a:solidFill>
+              </a14:hiddenFill>
+            </a:ext>
+          </a:extLst>
+        </p:spPr>
+      </p:pic>
+      <p:pic>
+        <p:nvPicPr>
+          <p:cNvPr id="1026" name="Picture 2" descr="https://i0.wp.com/www.geographyrealm.com/wp-content/uploads/2019/02/Equal-Earth-Physical-Map-Raster.png?resize=840%2C463&amp;ssl=1"/>
+          <p:cNvPicPr>
+            <a:picLocks noChangeAspect="1" noChangeArrowheads="1"/>
+          </p:cNvPicPr>
+          <p:nvPr/>
+        </p:nvPicPr>
+        <p:blipFill>
+          <a:blip r:embed="rId3">
+            <a:extLst>
+              <a:ext uri="{28A0092B-C50C-407E-A947-70E740481C1C}">
+                <a14:useLocalDpi xmlns:a14="http://schemas.microsoft.com/office/drawing/2010/main" val="0"/>
+              </a:ext>
+            </a:extLst>
+          </a:blip>
+          <a:srcRect/>
+          <a:stretch>
+            <a:fillRect/>
+          </a:stretch>
+        </p:blipFill>
+        <p:spPr bwMode="auto">
+          <a:xfrm>
+            <a:off x="4380090" y="568557"/>
+            <a:ext cx="7596398" cy="4187063"/>
+          </a:xfrm>
+          <a:prstGeom prst="rect">
+            <a:avLst/>
+          </a:prstGeom>
+          <a:noFill/>
+          <a:extLst>
+            <a:ext uri="{909E8E84-426E-40DD-AFC4-6F175D3DCCD1}">
+              <a14:hiddenFill xmlns:a14="http://schemas.microsoft.com/office/drawing/2010/main">
+                <a:solidFill>
+                  <a:srgbClr val="FFFFFF"/>
+                </a:solidFill>
+              </a14:hiddenFill>
+            </a:ext>
+          </a:extLst>
+        </p:spPr>
+      </p:pic>
+      <p:sp>
+        <p:nvSpPr>
+          <p:cNvPr id="5" name="Down Arrow 4"/>
+          <p:cNvSpPr/>
+          <p:nvPr/>
+        </p:nvSpPr>
+        <p:spPr>
+          <a:xfrm rot="19270700">
+            <a:off x="7953024" y="942623"/>
+            <a:ext cx="276578" cy="372534"/>
+          </a:xfrm>
+          <a:prstGeom prst="downArrow">
+            <a:avLst>
+              <a:gd name="adj1" fmla="val 43640"/>
+              <a:gd name="adj2" fmla="val 50000"/>
+            </a:avLst>
+          </a:prstGeom>
+          <a:solidFill>
+            <a:srgbClr val="FF0000"/>
+          </a:solidFill>
+          <a:ln>
+            <a:solidFill>
+              <a:srgbClr val="FF0000"/>
+            </a:solidFill>
+          </a:ln>
+        </p:spPr>
+        <p:style>
+          <a:lnRef idx="2">
+            <a:schemeClr val="accent1">
+              <a:shade val="50000"/>
+            </a:schemeClr>
+          </a:lnRef>
+          <a:fillRef idx="1">
+            <a:schemeClr val="accent1"/>
+          </a:fillRef>
+          <a:effectRef idx="0">
+            <a:schemeClr val="accent1"/>
+          </a:effectRef>
+          <a:fontRef idx="minor">
+            <a:schemeClr val="lt1"/>
+          </a:fontRef>
+        </p:style>
+        <p:txBody>
+          <a:bodyPr rtlCol="0" anchor="ctr"/>
+          <a:lstStyle/>
+          <a:p>
+            <a:pPr algn="ctr"/>
+            <a:endParaRPr lang="en-SG"/>
+          </a:p>
+        </p:txBody>
+      </p:sp>
+    </p:spTree>
+    <p:extLst>
+      <p:ext uri="{BB962C8B-B14F-4D97-AF65-F5344CB8AC3E}">
+        <p14:creationId xmlns:p14="http://schemas.microsoft.com/office/powerpoint/2010/main" val="2418432196"/>
+      </p:ext>
+    </p:extLst>
+  </p:cSld>
+  <p:clrMapOvr>
+    <a:masterClrMapping/>
+  </p:clrMapOvr>
+</p:sld>
+</file>
+
+<file path=ppt/slides/slide8.xml><?xml version="1.0" encoding="utf-8"?>
+<p:sld xmlns:a="http://schemas.openxmlformats.org/drawingml/2006/main" xmlns:r="http://schemas.openxmlformats.org/officeDocument/2006/relationships" xmlns:p="http://schemas.openxmlformats.org/presentationml/2006/main">
+  <p:cSld>
+    <p:spTree>
+      <p:nvGrpSpPr>
+        <p:cNvPr id="1" name=""/>
+        <p:cNvGrpSpPr/>
+        <p:nvPr/>
+      </p:nvGrpSpPr>
+      <p:grpSpPr>
+        <a:xfrm>
+          <a:off x="0" y="0"/>
+          <a:ext cx="0" cy="0"/>
+          <a:chOff x="0" y="0"/>
+          <a:chExt cx="0" cy="0"/>
+        </a:xfrm>
+      </p:grpSpPr>
+      <p:sp>
+        <p:nvSpPr>
+          <p:cNvPr id="3" name="Subtitle 5"/>
+          <p:cNvSpPr txBox="1">
+            <a:spLocks/>
+          </p:cNvSpPr>
+          <p:nvPr/>
+        </p:nvSpPr>
+        <p:spPr>
+          <a:xfrm>
+            <a:off x="711200" y="333274"/>
+            <a:ext cx="11017956" cy="6276370"/>
+          </a:xfrm>
+          <a:prstGeom prst="rect">
+            <a:avLst/>
+          </a:prstGeom>
+        </p:spPr>
+        <p:txBody>
+          <a:bodyPr vert="horz" lIns="91440" tIns="45720" rIns="91440" bIns="45720" rtlCol="0">
+            <a:normAutofit/>
+          </a:bodyPr>
+          <a:lstStyle>
+            <a:lvl1pPr marL="0" indent="0" algn="ctr" defTabSz="914400" rtl="0" eaLnBrk="1" latinLnBrk="0" hangingPunct="1">
+              <a:lnSpc>
+                <a:spcPct val="90000"/>
+              </a:lnSpc>
+              <a:spcBef>
+                <a:spcPts val="1000"/>
+              </a:spcBef>
+              <a:buFont typeface="Arial" panose="020B0604020202020204" pitchFamily="34" charset="0"/>
+              <a:buNone/>
+              <a:defRPr sz="2400" kern="1200">
+                <a:solidFill>
+                  <a:schemeClr val="tx1"/>
+                </a:solidFill>
+                <a:latin typeface="+mn-lt"/>
+                <a:ea typeface="+mn-ea"/>
+                <a:cs typeface="+mn-cs"/>
+              </a:defRPr>
+            </a:lvl1pPr>
+            <a:lvl2pPr marL="457200" indent="0" algn="ctr" defTabSz="914400" rtl="0" eaLnBrk="1" latinLnBrk="0" hangingPunct="1">
+              <a:lnSpc>
+                <a:spcPct val="90000"/>
+              </a:lnSpc>
+              <a:spcBef>
+                <a:spcPts val="500"/>
+              </a:spcBef>
+              <a:buFont typeface="Arial" panose="020B0604020202020204" pitchFamily="34" charset="0"/>
+              <a:buNone/>
+              <a:defRPr sz="2000" kern="1200">
+                <a:solidFill>
+                  <a:schemeClr val="tx1"/>
+                </a:solidFill>
+                <a:latin typeface="+mn-lt"/>
+                <a:ea typeface="+mn-ea"/>
+                <a:cs typeface="+mn-cs"/>
+              </a:defRPr>
+            </a:lvl2pPr>
+            <a:lvl3pPr marL="914400" indent="0" algn="ctr" defTabSz="914400" rtl="0" eaLnBrk="1" latinLnBrk="0" hangingPunct="1">
+              <a:lnSpc>
+                <a:spcPct val="90000"/>
+              </a:lnSpc>
+              <a:spcBef>
+                <a:spcPts val="500"/>
+              </a:spcBef>
+              <a:buFont typeface="Arial" panose="020B0604020202020204" pitchFamily="34" charset="0"/>
+              <a:buNone/>
+              <a:defRPr sz="1800" kern="1200">
+                <a:solidFill>
+                  <a:schemeClr val="tx1"/>
+                </a:solidFill>
+                <a:latin typeface="+mn-lt"/>
+                <a:ea typeface="+mn-ea"/>
+                <a:cs typeface="+mn-cs"/>
+              </a:defRPr>
+            </a:lvl3pPr>
+            <a:lvl4pPr marL="1371600" indent="0" algn="ctr" defTabSz="914400" rtl="0" eaLnBrk="1" latinLnBrk="0" hangingPunct="1">
+              <a:lnSpc>
+                <a:spcPct val="90000"/>
+              </a:lnSpc>
+              <a:spcBef>
+                <a:spcPts val="500"/>
+              </a:spcBef>
+              <a:buFont typeface="Arial" panose="020B0604020202020204" pitchFamily="34" charset="0"/>
+              <a:buNone/>
+              <a:defRPr sz="1600" kern="1200">
+                <a:solidFill>
+                  <a:schemeClr val="tx1"/>
+                </a:solidFill>
+                <a:latin typeface="+mn-lt"/>
+                <a:ea typeface="+mn-ea"/>
+                <a:cs typeface="+mn-cs"/>
+              </a:defRPr>
+            </a:lvl4pPr>
+            <a:lvl5pPr marL="1828800" indent="0" algn="ctr" defTabSz="914400" rtl="0" eaLnBrk="1" latinLnBrk="0" hangingPunct="1">
+              <a:lnSpc>
+                <a:spcPct val="90000"/>
+              </a:lnSpc>
+              <a:spcBef>
+                <a:spcPts val="500"/>
+              </a:spcBef>
+              <a:buFont typeface="Arial" panose="020B0604020202020204" pitchFamily="34" charset="0"/>
+              <a:buNone/>
+              <a:defRPr sz="1600" kern="1200">
+                <a:solidFill>
+                  <a:schemeClr val="tx1"/>
+                </a:solidFill>
+                <a:latin typeface="+mn-lt"/>
+                <a:ea typeface="+mn-ea"/>
+                <a:cs typeface="+mn-cs"/>
+              </a:defRPr>
+            </a:lvl5pPr>
+            <a:lvl6pPr marL="2286000" indent="0" algn="ctr" defTabSz="914400" rtl="0" eaLnBrk="1" latinLnBrk="0" hangingPunct="1">
+              <a:lnSpc>
+                <a:spcPct val="90000"/>
+              </a:lnSpc>
+              <a:spcBef>
+                <a:spcPts val="500"/>
+              </a:spcBef>
+              <a:buFont typeface="Arial" panose="020B0604020202020204" pitchFamily="34" charset="0"/>
+              <a:buNone/>
+              <a:defRPr sz="1600" kern="1200">
+                <a:solidFill>
+                  <a:schemeClr val="tx1"/>
+                </a:solidFill>
+                <a:latin typeface="+mn-lt"/>
+                <a:ea typeface="+mn-ea"/>
+                <a:cs typeface="+mn-cs"/>
+              </a:defRPr>
+            </a:lvl6pPr>
+            <a:lvl7pPr marL="2743200" indent="0" algn="ctr" defTabSz="914400" rtl="0" eaLnBrk="1" latinLnBrk="0" hangingPunct="1">
+              <a:lnSpc>
+                <a:spcPct val="90000"/>
+              </a:lnSpc>
+              <a:spcBef>
+                <a:spcPts val="500"/>
+              </a:spcBef>
+              <a:buFont typeface="Arial" panose="020B0604020202020204" pitchFamily="34" charset="0"/>
+              <a:buNone/>
+              <a:defRPr sz="1600" kern="1200">
+                <a:solidFill>
+                  <a:schemeClr val="tx1"/>
+                </a:solidFill>
+                <a:latin typeface="+mn-lt"/>
+                <a:ea typeface="+mn-ea"/>
+                <a:cs typeface="+mn-cs"/>
+              </a:defRPr>
+            </a:lvl7pPr>
+            <a:lvl8pPr marL="3200400" indent="0" algn="ctr" defTabSz="914400" rtl="0" eaLnBrk="1" latinLnBrk="0" hangingPunct="1">
+              <a:lnSpc>
+                <a:spcPct val="90000"/>
+              </a:lnSpc>
+              <a:spcBef>
+                <a:spcPts val="500"/>
+              </a:spcBef>
+              <a:buFont typeface="Arial" panose="020B0604020202020204" pitchFamily="34" charset="0"/>
+              <a:buNone/>
+              <a:defRPr sz="1600" kern="1200">
+                <a:solidFill>
+                  <a:schemeClr val="tx1"/>
+                </a:solidFill>
+                <a:latin typeface="+mn-lt"/>
+                <a:ea typeface="+mn-ea"/>
+                <a:cs typeface="+mn-cs"/>
+              </a:defRPr>
+            </a:lvl8pPr>
+            <a:lvl9pPr marL="3657600" indent="0" algn="ctr" defTabSz="914400" rtl="0" eaLnBrk="1" latinLnBrk="0" hangingPunct="1">
+              <a:lnSpc>
+                <a:spcPct val="90000"/>
+              </a:lnSpc>
+              <a:spcBef>
+                <a:spcPts val="500"/>
+              </a:spcBef>
+              <a:buFont typeface="Arial" panose="020B0604020202020204" pitchFamily="34" charset="0"/>
+              <a:buNone/>
+              <a:defRPr sz="1600" kern="1200">
+                <a:solidFill>
+                  <a:schemeClr val="tx1"/>
+                </a:solidFill>
+                <a:latin typeface="+mn-lt"/>
+                <a:ea typeface="+mn-ea"/>
+                <a:cs typeface="+mn-cs"/>
+              </a:defRPr>
+            </a:lvl9pPr>
+          </a:lstStyle>
+          <a:p>
+            <a:pPr algn="l">
+              <a:lnSpc>
+                <a:spcPct val="100000"/>
+              </a:lnSpc>
+              <a:spcBef>
+                <a:spcPts val="0"/>
+              </a:spcBef>
+              <a:defRPr/>
+            </a:pPr>
+            <a:r>
+              <a:rPr lang="en-US" sz="4400" dirty="0" smtClean="0"/>
+              <a:t>Arnoud Boot</a:t>
+            </a:r>
+          </a:p>
+          <a:p>
+            <a:pPr algn="l">
+              <a:lnSpc>
+                <a:spcPct val="100000"/>
+              </a:lnSpc>
+              <a:spcBef>
+                <a:spcPts val="0"/>
+              </a:spcBef>
+              <a:defRPr/>
+            </a:pPr>
+            <a:endParaRPr lang="en-US" sz="4400" dirty="0"/>
+          </a:p>
+          <a:p>
+            <a:pPr algn="l">
+              <a:lnSpc>
+                <a:spcPct val="100000"/>
+              </a:lnSpc>
+              <a:spcBef>
+                <a:spcPts val="0"/>
+              </a:spcBef>
+              <a:defRPr/>
+            </a:pPr>
+            <a:endParaRPr lang="en-US" sz="4400" dirty="0" smtClean="0"/>
+          </a:p>
+          <a:p>
+            <a:pPr algn="l">
+              <a:lnSpc>
+                <a:spcPct val="100000"/>
+              </a:lnSpc>
+              <a:spcBef>
+                <a:spcPts val="0"/>
+              </a:spcBef>
+              <a:defRPr/>
+            </a:pPr>
+            <a:endParaRPr lang="en-US" sz="4400" dirty="0"/>
+          </a:p>
+          <a:p>
+            <a:pPr algn="l">
+              <a:lnSpc>
+                <a:spcPct val="100000"/>
+              </a:lnSpc>
+              <a:spcBef>
+                <a:spcPts val="0"/>
+              </a:spcBef>
+              <a:defRPr/>
+            </a:pPr>
+            <a:endParaRPr lang="en-US" sz="4400" dirty="0" smtClean="0"/>
+          </a:p>
+          <a:p>
+            <a:pPr algn="l">
+              <a:lnSpc>
+                <a:spcPct val="100000"/>
+              </a:lnSpc>
+              <a:spcBef>
+                <a:spcPts val="0"/>
+              </a:spcBef>
+              <a:defRPr/>
+            </a:pPr>
+            <a:endParaRPr lang="en-US" sz="4400" dirty="0"/>
+          </a:p>
+          <a:p>
+            <a:pPr algn="l">
+              <a:lnSpc>
+                <a:spcPct val="100000"/>
+              </a:lnSpc>
+              <a:spcBef>
+                <a:spcPts val="0"/>
+              </a:spcBef>
+              <a:defRPr/>
+            </a:pPr>
+            <a:endParaRPr lang="en-US" sz="4400" dirty="0" smtClean="0"/>
+          </a:p>
+          <a:p>
+            <a:pPr algn="l">
+              <a:lnSpc>
+                <a:spcPct val="100000"/>
+              </a:lnSpc>
+              <a:spcBef>
+                <a:spcPts val="0"/>
+              </a:spcBef>
+              <a:defRPr/>
+            </a:pPr>
+            <a:endParaRPr lang="en-US" sz="2000" dirty="0" smtClean="0"/>
+          </a:p>
+          <a:p>
+            <a:pPr algn="l">
+              <a:lnSpc>
+                <a:spcPct val="100000"/>
+              </a:lnSpc>
+              <a:spcBef>
+                <a:spcPts val="0"/>
+              </a:spcBef>
+              <a:defRPr/>
+            </a:pPr>
+            <a:r>
+              <a:rPr lang="en-US" sz="2000" dirty="0" smtClean="0"/>
+              <a:t>PhD in molecular biology: Genomic instability of thyroid and colorectal cancer.</a:t>
+            </a:r>
+          </a:p>
+          <a:p>
+            <a:pPr algn="l">
+              <a:lnSpc>
+                <a:spcPct val="100000"/>
+              </a:lnSpc>
+              <a:spcBef>
+                <a:spcPts val="0"/>
+              </a:spcBef>
+              <a:defRPr/>
+            </a:pPr>
+            <a:endParaRPr lang="en-US" sz="2000" dirty="0"/>
+          </a:p>
+          <a:p>
+            <a:pPr algn="l">
+              <a:lnSpc>
+                <a:spcPct val="100000"/>
+              </a:lnSpc>
+              <a:spcBef>
+                <a:spcPts val="0"/>
+              </a:spcBef>
+              <a:defRPr/>
+            </a:pPr>
+            <a:r>
+              <a:rPr lang="en-US" sz="2000" dirty="0" smtClean="0"/>
+              <a:t>Since 2016 part of Steve </a:t>
+            </a:r>
+            <a:r>
+              <a:rPr lang="en-US" sz="2000" dirty="0" err="1" smtClean="0"/>
+              <a:t>Rozen’s</a:t>
+            </a:r>
+            <a:r>
+              <a:rPr lang="en-US" sz="2000" dirty="0" smtClean="0"/>
+              <a:t> lab at the Duke-NUS medical school in Singapore.</a:t>
+            </a:r>
+          </a:p>
+        </p:txBody>
+      </p:sp>
+      <p:pic>
+        <p:nvPicPr>
+          <p:cNvPr id="4" name="Picture 14" descr="https://www.duke-nus.edu.sg/images/librariesprovider6/pem-staff-library/arnoud-boot1.jpg?Status=Master&amp;sfvrsn=c04fc007_0"/>
+          <p:cNvPicPr>
+            <a:picLocks noChangeAspect="1" noChangeArrowheads="1"/>
+          </p:cNvPicPr>
+          <p:nvPr/>
+        </p:nvPicPr>
+        <p:blipFill>
+          <a:blip r:embed="rId2">
+            <a:extLst>
+              <a:ext uri="{28A0092B-C50C-407E-A947-70E740481C1C}">
+                <a14:useLocalDpi xmlns:a14="http://schemas.microsoft.com/office/drawing/2010/main" val="0"/>
+              </a:ext>
+            </a:extLst>
+          </a:blip>
+          <a:srcRect/>
+          <a:stretch>
+            <a:fillRect/>
+          </a:stretch>
+        </p:blipFill>
+        <p:spPr bwMode="auto">
+          <a:xfrm>
+            <a:off x="1145771" y="1265804"/>
+            <a:ext cx="2105428" cy="2947599"/>
+          </a:xfrm>
+          <a:prstGeom prst="rect">
+            <a:avLst/>
+          </a:prstGeom>
+          <a:noFill/>
+          <a:extLst>
+            <a:ext uri="{909E8E84-426E-40DD-AFC4-6F175D3DCCD1}">
+              <a14:hiddenFill xmlns:a14="http://schemas.microsoft.com/office/drawing/2010/main">
+                <a:solidFill>
+                  <a:srgbClr val="FFFFFF"/>
+                </a:solidFill>
+              </a14:hiddenFill>
+            </a:ext>
+          </a:extLst>
+        </p:spPr>
+      </p:pic>
+      <p:pic>
+        <p:nvPicPr>
+          <p:cNvPr id="1026" name="Picture 2" descr="https://i0.wp.com/www.geographyrealm.com/wp-content/uploads/2019/02/Equal-Earth-Physical-Map-Raster.png?resize=840%2C463&amp;ssl=1"/>
+          <p:cNvPicPr>
+            <a:picLocks noChangeAspect="1" noChangeArrowheads="1"/>
+          </p:cNvPicPr>
+          <p:nvPr/>
+        </p:nvPicPr>
+        <p:blipFill rotWithShape="1">
+          <a:blip r:embed="rId3">
+            <a:extLst>
+              <a:ext uri="{28A0092B-C50C-407E-A947-70E740481C1C}">
+                <a14:useLocalDpi xmlns:a14="http://schemas.microsoft.com/office/drawing/2010/main" val="0"/>
+              </a:ext>
+            </a:extLst>
+          </a:blip>
+          <a:srcRect t="5968" b="7891"/>
+          <a:stretch/>
+        </p:blipFill>
+        <p:spPr bwMode="auto">
+          <a:xfrm>
+            <a:off x="4380090" y="818444"/>
+            <a:ext cx="7596398" cy="3606800"/>
+          </a:xfrm>
+          <a:prstGeom prst="rect">
+            <a:avLst/>
+          </a:prstGeom>
+          <a:noFill/>
+          <a:extLst>
+            <a:ext uri="{909E8E84-426E-40DD-AFC4-6F175D3DCCD1}">
+              <a14:hiddenFill xmlns:a14="http://schemas.microsoft.com/office/drawing/2010/main">
+                <a:solidFill>
+                  <a:srgbClr val="FFFFFF"/>
+                </a:solidFill>
+              </a14:hiddenFill>
+            </a:ext>
+          </a:extLst>
+        </p:spPr>
+      </p:pic>
+      <p:sp>
+        <p:nvSpPr>
+          <p:cNvPr id="5" name="Down Arrow 4"/>
+          <p:cNvSpPr/>
+          <p:nvPr/>
+        </p:nvSpPr>
+        <p:spPr>
+          <a:xfrm rot="19270700" flipV="1">
+            <a:off x="10302014" y="2555277"/>
+            <a:ext cx="276578" cy="368653"/>
+          </a:xfrm>
+          <a:prstGeom prst="downArrow">
+            <a:avLst>
+              <a:gd name="adj1" fmla="val 43640"/>
+              <a:gd name="adj2" fmla="val 50000"/>
+            </a:avLst>
+          </a:prstGeom>
+          <a:solidFill>
+            <a:srgbClr val="FF0000"/>
+          </a:solidFill>
+          <a:ln>
+            <a:solidFill>
+              <a:srgbClr val="FF0000"/>
+            </a:solidFill>
+          </a:ln>
+        </p:spPr>
+        <p:style>
+          <a:lnRef idx="2">
+            <a:schemeClr val="accent1">
+              <a:shade val="50000"/>
+            </a:schemeClr>
+          </a:lnRef>
+          <a:fillRef idx="1">
+            <a:schemeClr val="accent1"/>
+          </a:fillRef>
+          <a:effectRef idx="0">
+            <a:schemeClr val="accent1"/>
+          </a:effectRef>
+          <a:fontRef idx="minor">
+            <a:schemeClr val="lt1"/>
+          </a:fontRef>
+        </p:style>
+        <p:txBody>
+          <a:bodyPr rtlCol="0" anchor="ctr"/>
+          <a:lstStyle/>
+          <a:p>
+            <a:pPr algn="ctr"/>
+            <a:endParaRPr lang="en-SG"/>
+          </a:p>
+        </p:txBody>
+      </p:sp>
+    </p:spTree>
+    <p:extLst>
+      <p:ext uri="{BB962C8B-B14F-4D97-AF65-F5344CB8AC3E}">
+        <p14:creationId xmlns:p14="http://schemas.microsoft.com/office/powerpoint/2010/main" val="3810182759"/>
+      </p:ext>
+    </p:extLst>
+  </p:cSld>
+  <p:clrMapOvr>
+    <a:masterClrMapping/>
+  </p:clrMapOvr>
+</p:sld>
+</file>
+
+<file path=ppt/slides/slide9.xml><?xml version="1.0" encoding="utf-8"?>
+<p:sld xmlns:a="http://schemas.openxmlformats.org/drawingml/2006/main" xmlns:r="http://schemas.openxmlformats.org/officeDocument/2006/relationships" xmlns:p="http://schemas.openxmlformats.org/presentationml/2006/main">
+  <p:cSld>
+    <p:spTree>
+      <p:nvGrpSpPr>
+        <p:cNvPr id="1" name=""/>
+        <p:cNvGrpSpPr/>
+        <p:nvPr/>
+      </p:nvGrpSpPr>
+      <p:grpSpPr>
+        <a:xfrm>
+          <a:off x="0" y="0"/>
+          <a:ext cx="0" cy="0"/>
+          <a:chOff x="0" y="0"/>
+          <a:chExt cx="0" cy="0"/>
+        </a:xfrm>
+      </p:grpSpPr>
+      <p:sp>
+        <p:nvSpPr>
+          <p:cNvPr id="5" name="Title 4"/>
+          <p:cNvSpPr>
+            <a:spLocks noGrp="1"/>
+          </p:cNvSpPr>
+          <p:nvPr>
+            <p:ph type="title"/>
+          </p:nvPr>
+        </p:nvSpPr>
+        <p:spPr>
+          <a:xfrm>
+            <a:off x="838200" y="76200"/>
+            <a:ext cx="3369733" cy="851820"/>
+          </a:xfrm>
+        </p:spPr>
+        <p:txBody>
+          <a:bodyPr>
+            <a:normAutofit/>
+          </a:bodyPr>
+          <a:lstStyle/>
+          <a:p>
+            <a:pPr algn="l"/>
+            <a:r>
+              <a:rPr lang="en-US" dirty="0" smtClean="0"/>
+              <a:t>Singapore</a:t>
+            </a:r>
+            <a:endParaRPr lang="en-US" dirty="0"/>
+          </a:p>
+        </p:txBody>
+      </p:sp>
+      <p:sp>
+        <p:nvSpPr>
+          <p:cNvPr id="4" name="Slide Number Placeholder 3"/>
+          <p:cNvSpPr>
+            <a:spLocks noGrp="1"/>
+          </p:cNvSpPr>
+          <p:nvPr>
+            <p:ph type="sldNum" sz="quarter" idx="12"/>
+          </p:nvPr>
+        </p:nvSpPr>
+        <p:spPr/>
+        <p:txBody>
+          <a:bodyPr/>
+          <a:lstStyle/>
+          <a:p>
+            <a:fld id="{B6F15528-21DE-4FAA-801E-634DDDAF4B2B}" type="slidenum">
+              <a:rPr lang="en-US" smtClean="0"/>
+              <a:pPr/>
+              <a:t>9</a:t>
+            </a:fld>
+            <a:endParaRPr lang="en-US"/>
+          </a:p>
+        </p:txBody>
+      </p:sp>
+      <p:sp>
+        <p:nvSpPr>
+          <p:cNvPr id="7" name="TextBox 6"/>
+          <p:cNvSpPr txBox="1"/>
+          <p:nvPr/>
+        </p:nvSpPr>
+        <p:spPr>
+          <a:xfrm>
+            <a:off x="5867400" y="1371600"/>
+            <a:ext cx="5943600" cy="4493538"/>
+          </a:xfrm>
+          <a:prstGeom prst="rect">
+            <a:avLst/>
+          </a:prstGeom>
+          <a:noFill/>
+        </p:spPr>
+        <p:txBody>
+          <a:bodyPr wrap="square" rtlCol="0">
+            <a:spAutoFit/>
+          </a:bodyPr>
+          <a:lstStyle/>
+          <a:p>
+            <a:pPr marL="342900" indent="-342900">
+              <a:spcAft>
+                <a:spcPts val="0"/>
+              </a:spcAft>
+              <a:buFont typeface="Arial" panose="020B0604020202020204" pitchFamily="34" charset="0"/>
+              <a:buChar char="•"/>
+            </a:pPr>
+            <a:r>
+              <a:rPr lang="en-US" sz="3200" dirty="0"/>
+              <a:t>Small: 50 km (31 mi) </a:t>
+            </a:r>
+            <a:r>
+              <a:rPr lang="en-US" sz="3200" dirty="0" smtClean="0"/>
+              <a:t> east-west</a:t>
+            </a:r>
+          </a:p>
+          <a:p>
+            <a:pPr>
+              <a:spcAft>
+                <a:spcPts val="1200"/>
+              </a:spcAft>
+            </a:pPr>
+            <a:r>
+              <a:rPr lang="en-US" sz="3200" dirty="0" smtClean="0"/>
+              <a:t>      26 </a:t>
+            </a:r>
+            <a:r>
+              <a:rPr lang="en-US" sz="3200" dirty="0"/>
+              <a:t>km (16 mi) north-south</a:t>
+            </a:r>
+          </a:p>
+          <a:p>
+            <a:pPr marL="342900" indent="-342900">
+              <a:spcAft>
+                <a:spcPts val="1200"/>
+              </a:spcAft>
+              <a:buFont typeface="Arial" panose="020B0604020202020204" pitchFamily="34" charset="0"/>
+              <a:buChar char="•"/>
+            </a:pPr>
+            <a:r>
+              <a:rPr lang="en-US" sz="3200" dirty="0" smtClean="0"/>
+              <a:t>5.8 </a:t>
+            </a:r>
+            <a:r>
+              <a:rPr lang="en-US" sz="3200" dirty="0"/>
+              <a:t>million people</a:t>
+            </a:r>
+          </a:p>
+          <a:p>
+            <a:pPr marL="342900" indent="-342900">
+              <a:spcAft>
+                <a:spcPts val="1200"/>
+              </a:spcAft>
+              <a:buFont typeface="Arial" panose="020B0604020202020204" pitchFamily="34" charset="0"/>
+              <a:buChar char="•"/>
+            </a:pPr>
+            <a:r>
+              <a:rPr lang="en-US" sz="3200" dirty="0" smtClean="0"/>
+              <a:t>Formerly poor, now </a:t>
+            </a:r>
+            <a:r>
+              <a:rPr lang="en-US" sz="3200" dirty="0"/>
+              <a:t>r</a:t>
+            </a:r>
+            <a:r>
+              <a:rPr lang="en-US" sz="3200" dirty="0" smtClean="0"/>
+              <a:t>ich</a:t>
+            </a:r>
+            <a:r>
+              <a:rPr lang="en-US" sz="3200" dirty="0"/>
+              <a:t>: per capita GDP &gt; </a:t>
+            </a:r>
+            <a:r>
+              <a:rPr lang="en-US" sz="3200" dirty="0" smtClean="0"/>
+              <a:t>US (purchasing power parity, includes non-citizens</a:t>
+            </a:r>
+            <a:r>
+              <a:rPr lang="en-US" sz="3200" dirty="0" smtClean="0"/>
+              <a:t>)</a:t>
+            </a:r>
+          </a:p>
+          <a:p>
+            <a:pPr marL="342900" indent="-342900">
+              <a:spcAft>
+                <a:spcPts val="1200"/>
+              </a:spcAft>
+              <a:buFont typeface="Arial" panose="020B0604020202020204" pitchFamily="34" charset="0"/>
+              <a:buChar char="•"/>
+            </a:pPr>
+            <a:r>
+              <a:rPr lang="en-US" sz="3200" dirty="0" smtClean="0"/>
+              <a:t>26 </a:t>
+            </a:r>
+            <a:r>
+              <a:rPr lang="en-US" sz="3200" dirty="0" err="1" smtClean="0"/>
+              <a:t>Covid</a:t>
+            </a:r>
+            <a:r>
+              <a:rPr lang="en-US" sz="3200" dirty="0" smtClean="0"/>
+              <a:t>-19 deaths total</a:t>
+            </a:r>
+            <a:endParaRPr lang="en-US" sz="3200" dirty="0"/>
+          </a:p>
+        </p:txBody>
+      </p:sp>
+      <p:sp>
+        <p:nvSpPr>
+          <p:cNvPr id="2" name="AutoShape 2" descr="Image result for lost in singapore little red dot"/>
+          <p:cNvSpPr>
+            <a:spLocks noChangeAspect="1" noChangeArrowheads="1"/>
+          </p:cNvSpPr>
+          <p:nvPr/>
+        </p:nvSpPr>
+        <p:spPr bwMode="auto">
+          <a:xfrm>
+            <a:off x="1679575" y="-144463"/>
+            <a:ext cx="2766529" cy="2766538"/>
+          </a:xfrm>
+          <a:prstGeom prst="rect">
+            <a:avLst/>
+          </a:prstGeom>
+          <a:noFill/>
+          <a:extLst>
+            <a:ext uri="{909E8E84-426E-40DD-AFC4-6F175D3DCCD1}">
+              <a14:hiddenFill xmlns:a14="http://schemas.microsoft.com/office/drawing/2010/main">
+                <a:solidFill>
+                  <a:srgbClr val="FFFFFF"/>
+                </a:solidFill>
+              </a14:hiddenFill>
+            </a:ext>
+          </a:extLst>
+        </p:spPr>
+        <p:txBody>
+          <a:bodyPr vert="horz" wrap="square" lIns="91440" tIns="45720" rIns="91440" bIns="45720" numCol="1" anchor="t" anchorCtr="0" compatLnSpc="1">
+            <a:prstTxWarp prst="textNoShape">
+              <a:avLst/>
+            </a:prstTxWarp>
+          </a:bodyPr>
+          <a:lstStyle/>
+          <a:p>
+            <a:endParaRPr lang="en-US"/>
+          </a:p>
+        </p:txBody>
+      </p:sp>
+      <p:sp>
+        <p:nvSpPr>
+          <p:cNvPr id="3" name="TextBox 2"/>
+          <p:cNvSpPr txBox="1"/>
+          <p:nvPr/>
+        </p:nvSpPr>
+        <p:spPr>
+          <a:xfrm>
+            <a:off x="228600" y="4419600"/>
+            <a:ext cx="5694957" cy="369332"/>
+          </a:xfrm>
+          <a:prstGeom prst="rect">
+            <a:avLst/>
+          </a:prstGeom>
+          <a:noFill/>
+        </p:spPr>
+        <p:txBody>
+          <a:bodyPr wrap="none" rtlCol="0">
+            <a:spAutoFit/>
+          </a:bodyPr>
+          <a:lstStyle/>
+          <a:p>
+            <a:r>
+              <a:rPr lang="en-US" dirty="0"/>
+              <a:t>http://kids.britannica.com/comptons/art-55105/Singapore</a:t>
+            </a:r>
+          </a:p>
+        </p:txBody>
+      </p:sp>
+      <p:grpSp>
+        <p:nvGrpSpPr>
+          <p:cNvPr id="8" name="Group 7"/>
+          <p:cNvGrpSpPr/>
+          <p:nvPr/>
+        </p:nvGrpSpPr>
+        <p:grpSpPr>
+          <a:xfrm>
+            <a:off x="914400" y="990600"/>
+            <a:ext cx="4457700" cy="3228975"/>
+            <a:chOff x="1066800" y="1992868"/>
+            <a:chExt cx="4457700" cy="3228975"/>
+          </a:xfrm>
+        </p:grpSpPr>
+        <p:pic>
+          <p:nvPicPr>
+            <p:cNvPr id="1026" name="Picture 2" descr="Map/Still:Singapore"/>
+            <p:cNvPicPr>
+              <a:picLocks noChangeAspect="1" noChangeArrowheads="1"/>
+            </p:cNvPicPr>
+            <p:nvPr/>
+          </p:nvPicPr>
+          <p:blipFill>
+            <a:blip r:embed="rId2">
+              <a:extLst>
+                <a:ext uri="{28A0092B-C50C-407E-A947-70E740481C1C}">
+                  <a14:useLocalDpi xmlns:a14="http://schemas.microsoft.com/office/drawing/2010/main" val="0"/>
+                </a:ext>
+              </a:extLst>
+            </a:blip>
+            <a:srcRect/>
+            <a:stretch>
+              <a:fillRect/>
+            </a:stretch>
+          </p:blipFill>
+          <p:spPr bwMode="auto">
+            <a:xfrm>
+              <a:off x="1066800" y="1992868"/>
+              <a:ext cx="4457700" cy="3228975"/>
+            </a:xfrm>
+            <a:prstGeom prst="rect">
+              <a:avLst/>
+            </a:prstGeom>
+            <a:noFill/>
+            <a:extLst>
+              <a:ext uri="{909E8E84-426E-40DD-AFC4-6F175D3DCCD1}">
+                <a14:hiddenFill xmlns:a14="http://schemas.microsoft.com/office/drawing/2010/main">
+                  <a:solidFill>
+                    <a:srgbClr val="FFFFFF"/>
+                  </a:solidFill>
+                </a14:hiddenFill>
+              </a:ext>
+            </a:extLst>
+          </p:spPr>
+        </p:pic>
+        <p:sp>
+          <p:nvSpPr>
+            <p:cNvPr id="6" name="Oval 5"/>
+            <p:cNvSpPr/>
+            <p:nvPr/>
+          </p:nvSpPr>
+          <p:spPr>
+            <a:xfrm>
+              <a:off x="3581400" y="4191000"/>
+              <a:ext cx="228600" cy="228600"/>
+            </a:xfrm>
+            <a:prstGeom prst="ellipse">
+              <a:avLst/>
+            </a:prstGeom>
+            <a:solidFill>
+              <a:srgbClr val="FF0000"/>
+            </a:solidFill>
+          </p:spPr>
+          <p:style>
+            <a:lnRef idx="2">
+              <a:schemeClr val="accent1">
+                <a:shade val="50000"/>
+              </a:schemeClr>
+            </a:lnRef>
+            <a:fillRef idx="1">
+              <a:schemeClr val="accent1"/>
+            </a:fillRef>
+            <a:effectRef idx="0">
+              <a:schemeClr val="accent1"/>
+            </a:effectRef>
+            <a:fontRef idx="minor">
+              <a:schemeClr val="lt1"/>
+            </a:fontRef>
+          </p:style>
+          <p:txBody>
+            <a:bodyPr rtlCol="0" anchor="ctr"/>
+            <a:lstStyle/>
+            <a:p>
+              <a:pPr algn="ctr"/>
+              <a:endParaRPr lang="en-US"/>
+            </a:p>
+          </p:txBody>
+        </p:sp>
+      </p:grpSp>
+      <p:sp>
+        <p:nvSpPr>
+          <p:cNvPr id="10" name="TextBox 9"/>
+          <p:cNvSpPr txBox="1"/>
+          <p:nvPr/>
+        </p:nvSpPr>
+        <p:spPr>
+          <a:xfrm>
+            <a:off x="3581400" y="6172200"/>
+            <a:ext cx="7772400" cy="923330"/>
+          </a:xfrm>
+          <a:prstGeom prst="rect">
+            <a:avLst/>
+          </a:prstGeom>
+          <a:noFill/>
+        </p:spPr>
+        <p:txBody>
+          <a:bodyPr wrap="square" rtlCol="0">
+            <a:spAutoFit/>
+          </a:bodyPr>
+          <a:lstStyle/>
+          <a:p>
+            <a:r>
+              <a:rPr lang="en-US" dirty="0"/>
+              <a:t>(From CIA World </a:t>
+            </a:r>
+            <a:r>
+              <a:rPr lang="en-US" dirty="0" err="1"/>
+              <a:t>Factbook</a:t>
+            </a:r>
+            <a:r>
+              <a:rPr lang="en-US" dirty="0"/>
+              <a:t>, </a:t>
+            </a:r>
+            <a:r>
+              <a:rPr lang="en-US" dirty="0">
+                <a:hlinkClick r:id="rId3"/>
+              </a:rPr>
+              <a:t>https://www.cia.gov/library/publications/the-world-factbook</a:t>
+            </a:r>
+            <a:r>
+              <a:rPr lang="en-US" dirty="0"/>
+              <a:t>, </a:t>
+            </a:r>
+            <a:r>
+              <a:rPr lang="en-US" dirty="0" smtClean="0"/>
+              <a:t>Nov </a:t>
+            </a:r>
+            <a:r>
+              <a:rPr lang="en-US" dirty="0"/>
+              <a:t>2017)</a:t>
+            </a:r>
+          </a:p>
+          <a:p>
+            <a:endParaRPr lang="en-US" dirty="0"/>
+          </a:p>
+        </p:txBody>
+      </p:sp>
+    </p:spTree>
+    <p:extLst>
+      <p:ext uri="{BB962C8B-B14F-4D97-AF65-F5344CB8AC3E}">
+        <p14:creationId xmlns:p14="http://schemas.microsoft.com/office/powerpoint/2010/main" val="2150459985"/>
+      </p:ext>
+    </p:extLst>
+  </p:cSld>
+  <p:clrMapOvr>
+    <a:masterClrMapping/>
+  </p:clrMapOvr>
+  <p:timing>
+    <p:tnLst>
+      <p:par>
+        <p:cTn id="1" dur="indefinite" restart="never" nodeType="tmRoot">
+          <p:childTnLst>
+            <p:seq concurrent="1" nextAc="seek">
+              <p:cTn id="2" dur="indefinite" nodeType="mainSeq">
+                <p:childTnLst>
+                  <p:par>
+                    <p:cTn id="3" fill="hold">
+                      <p:stCondLst>
+                        <p:cond delay="indefinite"/>
+                      </p:stCondLst>
+                      <p:childTnLst>
+                        <p:par>
+                          <p:cTn id="4" fill="hold">
+                            <p:stCondLst>
+                              <p:cond delay="0"/>
+                            </p:stCondLst>
+                            <p:childTnLst>
+                              <p:par>
+                                <p:cTn id="5" presetID="1" presetClass="entr" presetSubtype="0" fill="hold" grpId="0" nodeType="clickEffect">
+                                  <p:stCondLst>
+                                    <p:cond delay="0"/>
+                                  </p:stCondLst>
+                                  <p:childTnLst>
+                                    <p:set>
+                                      <p:cBhvr>
+                                        <p:cTn id="6" dur="1" fill="hold">
+                                          <p:stCondLst>
+                                            <p:cond delay="0"/>
+                                          </p:stCondLst>
+                                        </p:cTn>
+                                        <p:tgtEl>
+                                          <p:spTgt spid="7">
+                                            <p:txEl>
+                                              <p:pRg st="0" end="0"/>
+                                            </p:txEl>
+                                          </p:spTgt>
+                                        </p:tgtEl>
+                                        <p:attrNameLst>
+                                          <p:attrName>style.visibility</p:attrName>
+                                        </p:attrNameLst>
+                                      </p:cBhvr>
+                                      <p:to>
+                                        <p:strVal val="visible"/>
+                                      </p:to>
+                                    </p:set>
+                                  </p:childTnLst>
+                                </p:cTn>
+                              </p:par>
+                            </p:childTnLst>
+                          </p:cTn>
+                        </p:par>
+                      </p:childTnLst>
+                    </p:cTn>
+                  </p:par>
+                  <p:par>
+                    <p:cTn id="7" fill="hold">
+                      <p:stCondLst>
+                        <p:cond delay="indefinite"/>
+                      </p:stCondLst>
+                      <p:childTnLst>
+                        <p:par>
+                          <p:cTn id="8" fill="hold">
+                            <p:stCondLst>
+                              <p:cond delay="0"/>
+                            </p:stCondLst>
+                            <p:childTnLst>
+                              <p:par>
+                                <p:cTn id="9" presetID="1" presetClass="entr" presetSubtype="0" fill="hold" grpId="0" nodeType="clickEffect">
+                                  <p:stCondLst>
+                                    <p:cond delay="0"/>
+                                  </p:stCondLst>
+                                  <p:childTnLst>
+                                    <p:set>
+                                      <p:cBhvr>
+                                        <p:cTn id="10" dur="1" fill="hold">
+                                          <p:stCondLst>
+                                            <p:cond delay="0"/>
+                                          </p:stCondLst>
+                                        </p:cTn>
+                                        <p:tgtEl>
+                                          <p:spTgt spid="7">
+                                            <p:txEl>
+                                              <p:pRg st="1" end="1"/>
+                                            </p:txEl>
+                                          </p:spTgt>
+                                        </p:tgtEl>
+                                        <p:attrNameLst>
+                                          <p:attrName>style.visibility</p:attrName>
+                                        </p:attrNameLst>
+                                      </p:cBhvr>
+                                      <p:to>
+                                        <p:strVal val="visible"/>
+                                      </p:to>
+                                    </p:set>
+                                  </p:childTnLst>
+                                </p:cTn>
+                              </p:par>
+                            </p:childTnLst>
+                          </p:cTn>
+                        </p:par>
+                      </p:childTnLst>
+                    </p:cTn>
+                  </p:par>
+                  <p:par>
+                    <p:cTn id="11" fill="hold">
+                      <p:stCondLst>
+                        <p:cond delay="indefinite"/>
+                      </p:stCondLst>
+                      <p:childTnLst>
+                        <p:par>
+                          <p:cTn id="12" fill="hold">
+                            <p:stCondLst>
+                              <p:cond delay="0"/>
+                            </p:stCondLst>
+                            <p:childTnLst>
+                              <p:par>
+                                <p:cTn id="13" presetID="1" presetClass="entr" presetSubtype="0" fill="hold" grpId="0" nodeType="clickEffect">
+                                  <p:stCondLst>
+                                    <p:cond delay="0"/>
+                                  </p:stCondLst>
+                                  <p:childTnLst>
+                                    <p:set>
+                                      <p:cBhvr>
+                                        <p:cTn id="14" dur="1" fill="hold">
+                                          <p:stCondLst>
+                                            <p:cond delay="0"/>
+                                          </p:stCondLst>
+                                        </p:cTn>
+                                        <p:tgtEl>
+                                          <p:spTgt spid="7">
+                                            <p:txEl>
+                                              <p:pRg st="2" end="2"/>
+                                            </p:txEl>
+                                          </p:spTgt>
+                                        </p:tgtEl>
+                                        <p:attrNameLst>
+                                          <p:attrName>style.visibility</p:attrName>
+                                        </p:attrNameLst>
+                                      </p:cBhvr>
+                                      <p:to>
+                                        <p:strVal val="visible"/>
+                                      </p:to>
+                                    </p:set>
+                                  </p:childTnLst>
+                                </p:cTn>
+                              </p:par>
+                            </p:childTnLst>
+                          </p:cTn>
+                        </p:par>
+                      </p:childTnLst>
+                    </p:cTn>
+                  </p:par>
+                  <p:par>
+                    <p:cTn id="15" fill="hold">
+                      <p:stCondLst>
+                        <p:cond delay="indefinite"/>
+                      </p:stCondLst>
+                      <p:childTnLst>
+                        <p:par>
+                          <p:cTn id="16" fill="hold">
+                            <p:stCondLst>
+                              <p:cond delay="0"/>
+                            </p:stCondLst>
+                            <p:childTnLst>
+                              <p:par>
+                                <p:cTn id="17" presetID="1" presetClass="entr" presetSubtype="0" fill="hold" grpId="0" nodeType="clickEffect">
+                                  <p:stCondLst>
+                                    <p:cond delay="0"/>
+                                  </p:stCondLst>
+                                  <p:childTnLst>
+                                    <p:set>
+                                      <p:cBhvr>
+                                        <p:cTn id="18" dur="1" fill="hold">
+                                          <p:stCondLst>
+                                            <p:cond delay="0"/>
+                                          </p:stCondLst>
+                                        </p:cTn>
+                                        <p:tgtEl>
+                                          <p:spTgt spid="7">
+                                            <p:txEl>
+                                              <p:pRg st="3" end="3"/>
+                                            </p:txEl>
+                                          </p:spTgt>
+                                        </p:tgtEl>
+                                        <p:attrNameLst>
+                                          <p:attrName>style.visibility</p:attrName>
+                                        </p:attrNameLst>
+                                      </p:cBhvr>
+                                      <p:to>
+                                        <p:strVal val="visible"/>
+                                      </p:to>
+                                    </p:set>
+                                  </p:childTnLst>
+                                </p:cTn>
+                              </p:par>
+                            </p:childTnLst>
+                          </p:cTn>
+                        </p:par>
+                      </p:childTnLst>
+                    </p:cTn>
+                  </p:par>
+                  <p:par>
+                    <p:cTn id="19" fill="hold">
+                      <p:stCondLst>
+                        <p:cond delay="indefinite"/>
+                      </p:stCondLst>
+                      <p:childTnLst>
+                        <p:par>
+                          <p:cTn id="20" fill="hold">
+                            <p:stCondLst>
+                              <p:cond delay="0"/>
+                            </p:stCondLst>
+                            <p:childTnLst>
+                              <p:par>
+                                <p:cTn id="21" presetID="1" presetClass="entr" presetSubtype="0" fill="hold" grpId="0" nodeType="clickEffect">
+                                  <p:stCondLst>
+                                    <p:cond delay="0"/>
+                                  </p:stCondLst>
+                                  <p:childTnLst>
+                                    <p:set>
+                                      <p:cBhvr>
+                                        <p:cTn id="22" dur="1" fill="hold">
+                                          <p:stCondLst>
+                                            <p:cond delay="0"/>
+                                          </p:stCondLst>
+                                        </p:cTn>
+                                        <p:tgtEl>
+                                          <p:spTgt spid="7">
+                                            <p:txEl>
+                                              <p:pRg st="4" end="4"/>
+                                            </p:txEl>
+                                          </p:spTgt>
+                                        </p:tgtEl>
+                                        <p:attrNameLst>
+                                          <p:attrName>style.visibility</p:attrName>
+                                        </p:attrNameLst>
+                                      </p:cBhvr>
+                                      <p:to>
+                                        <p:strVal val="visible"/>
+                                      </p:to>
+                                    </p:set>
+                                  </p:childTnLst>
+                                </p:cTn>
+                              </p:par>
+                            </p:childTnLst>
+                          </p:cTn>
+                        </p:par>
+                      </p:childTnLst>
+                    </p:cTn>
+                  </p:par>
+                </p:childTnLst>
+              </p:cTn>
+              <p:prevCondLst>
+                <p:cond evt="onPrev" delay="0">
+                  <p:tgtEl>
+                    <p:sldTgt/>
+                  </p:tgtEl>
+                </p:cond>
+              </p:prevCondLst>
+              <p:nextCondLst>
+                <p:cond evt="onNext" delay="0">
+                  <p:tgtEl>
+                    <p:sldTgt/>
+                  </p:tgtEl>
+                </p:cond>
+              </p:nextCondLst>
+            </p:seq>
+          </p:childTnLst>
+        </p:cTn>
+      </p:par>
+    </p:tnLst>
+    <p:bldLst>
+      <p:bldP spid="7" grpId="0" build="p"/>
+    </p:bldLst>
   </p:timing>
 </p:sld>
 </file>

</xml_diff>